<commit_message>
added source for nsa picture
</commit_message>
<xml_diff>
--- a/Reverse Engineering.pptx
+++ b/Reverse Engineering.pptx
@@ -129,6 +129,18 @@
     </p:ext>
   </p:extLst>
 </p:presentation>
+</file>
+
+<file path=ppt/commentAuthors.xml><?xml version="1.0" encoding="utf-8"?>
+<p:cmAuthorLst xmlns:a="http://schemas.openxmlformats.org/drawingml/2006/main" xmlns:r="http://schemas.openxmlformats.org/officeDocument/2006/relationships" xmlns:p="http://schemas.openxmlformats.org/presentationml/2006/main">
+  <p:cmAuthor id="1" name="c.hofsom@gmail.com" initials="c" lastIdx="1" clrIdx="0">
+    <p:extLst>
+      <p:ext uri="{19B8F6BF-5375-455C-9EA6-DF929625EA0E}">
+        <p15:presenceInfo xmlns:p15="http://schemas.microsoft.com/office/powerpoint/2012/main" userId="826ed02c07d105cd" providerId="Windows Live"/>
+      </p:ext>
+    </p:extLst>
+  </p:cmAuthor>
+</p:cmAuthorLst>
 </file>
 
 <file path=ppt/revisionInfo.xml><?xml version="1.0" encoding="utf-8"?>
@@ -9255,7 +9267,7 @@
         <p:fade/>
       </p:transition>
     </mc:Choice>
-    <mc:Fallback xmlns:p15="http://schemas.microsoft.com/office/powerpoint/2012/main" xmlns="">
+    <mc:Fallback xmlns="" xmlns:p15="http://schemas.microsoft.com/office/powerpoint/2012/main">
       <p:transition spd="med">
         <p:fade/>
       </p:transition>
@@ -9480,7 +9492,7 @@
         <p:fade/>
       </p:transition>
     </mc:Choice>
-    <mc:Fallback xmlns:p15="http://schemas.microsoft.com/office/powerpoint/2012/main" xmlns="">
+    <mc:Fallback xmlns="" xmlns:p15="http://schemas.microsoft.com/office/powerpoint/2012/main">
       <p:transition spd="med">
         <p:fade/>
       </p:transition>
@@ -9779,7 +9791,7 @@
         <p:fade/>
       </p:transition>
     </mc:Choice>
-    <mc:Fallback xmlns:p15="http://schemas.microsoft.com/office/powerpoint/2012/main" xmlns="">
+    <mc:Fallback xmlns="" xmlns:p15="http://schemas.microsoft.com/office/powerpoint/2012/main">
       <p:transition spd="med">
         <p:fade/>
       </p:transition>
@@ -10228,7 +10240,7 @@
         <p:fade/>
       </p:transition>
     </mc:Choice>
-    <mc:Fallback xmlns:p15="http://schemas.microsoft.com/office/powerpoint/2012/main" xmlns="">
+    <mc:Fallback xmlns="" xmlns:p15="http://schemas.microsoft.com/office/powerpoint/2012/main">
       <p:transition spd="med">
         <p:fade/>
       </p:transition>
@@ -10545,7 +10557,7 @@
         <p:fade/>
       </p:transition>
     </mc:Choice>
-    <mc:Fallback xmlns:p15="http://schemas.microsoft.com/office/powerpoint/2012/main" xmlns="">
+    <mc:Fallback xmlns="" xmlns:p15="http://schemas.microsoft.com/office/powerpoint/2012/main">
       <p:transition spd="med">
         <p:fade/>
       </p:transition>
@@ -10885,7 +10897,7 @@
         <p:fade/>
       </p:transition>
     </mc:Choice>
-    <mc:Fallback xmlns:p15="http://schemas.microsoft.com/office/powerpoint/2012/main" xmlns="">
+    <mc:Fallback xmlns="" xmlns:p15="http://schemas.microsoft.com/office/powerpoint/2012/main">
       <p:transition spd="med">
         <p:fade/>
       </p:transition>
@@ -11296,7 +11308,7 @@
         <p:fade/>
       </p:transition>
     </mc:Choice>
-    <mc:Fallback xmlns:p15="http://schemas.microsoft.com/office/powerpoint/2012/main" xmlns="">
+    <mc:Fallback xmlns="" xmlns:p15="http://schemas.microsoft.com/office/powerpoint/2012/main">
       <p:transition spd="med">
         <p:fade/>
       </p:transition>
@@ -11610,7 +11622,7 @@
         <p:fade/>
       </p:transition>
     </mc:Choice>
-    <mc:Fallback xmlns:p15="http://schemas.microsoft.com/office/powerpoint/2012/main" xmlns="">
+    <mc:Fallback xmlns="" xmlns:p15="http://schemas.microsoft.com/office/powerpoint/2012/main">
       <p:transition spd="med">
         <p:fade/>
       </p:transition>
@@ -11876,7 +11888,7 @@
         <p:fade/>
       </p:transition>
     </mc:Choice>
-    <mc:Fallback xmlns:p15="http://schemas.microsoft.com/office/powerpoint/2012/main" xmlns="">
+    <mc:Fallback xmlns="" xmlns:p15="http://schemas.microsoft.com/office/powerpoint/2012/main">
       <p:transition spd="med">
         <p:fade/>
       </p:transition>
@@ -12336,7 +12348,7 @@
         <p:fade/>
       </p:transition>
     </mc:Choice>
-    <mc:Fallback xmlns:p15="http://schemas.microsoft.com/office/powerpoint/2012/main" xmlns="">
+    <mc:Fallback xmlns="" xmlns:p15="http://schemas.microsoft.com/office/powerpoint/2012/main">
       <p:transition spd="med">
         <p:fade/>
       </p:transition>
@@ -13455,7 +13467,7 @@
         <p:fade/>
       </p:transition>
     </mc:Choice>
-    <mc:Fallback xmlns:p15="http://schemas.microsoft.com/office/powerpoint/2012/main" xmlns="">
+    <mc:Fallback xmlns="" xmlns:p15="http://schemas.microsoft.com/office/powerpoint/2012/main">
       <p:transition spd="med">
         <p:fade/>
       </p:transition>
@@ -13652,7 +13664,7 @@
         <p:fade/>
       </p:transition>
     </mc:Choice>
-    <mc:Fallback xmlns:p15="http://schemas.microsoft.com/office/powerpoint/2012/main" xmlns="">
+    <mc:Fallback xmlns="" xmlns:p15="http://schemas.microsoft.com/office/powerpoint/2012/main">
       <p:transition spd="med">
         <p:fade/>
       </p:transition>
@@ -13871,7 +13883,7 @@
         <p:fade/>
       </p:transition>
     </mc:Choice>
-    <mc:Fallback xmlns:p15="http://schemas.microsoft.com/office/powerpoint/2012/main" xmlns="">
+    <mc:Fallback xmlns="" xmlns:p15="http://schemas.microsoft.com/office/powerpoint/2012/main">
       <p:transition spd="med">
         <p:fade/>
       </p:transition>
@@ -14332,6 +14344,41 @@
           </a:ln>
         </p:spPr>
       </p:pic>
+      <p:sp>
+        <p:nvSpPr>
+          <p:cNvPr id="2" name="Textfeld 1">
+            <a:extLst>
+              <a:ext uri="{FF2B5EF4-FFF2-40B4-BE49-F238E27FC236}">
+                <a16:creationId xmlns:a16="http://schemas.microsoft.com/office/drawing/2014/main" id="{1C5204DB-FBAC-4BCB-91FC-491798B91EC0}"/>
+              </a:ext>
+            </a:extLst>
+          </p:cNvPr>
+          <p:cNvSpPr txBox="1"/>
+          <p:nvPr/>
+        </p:nvSpPr>
+        <p:spPr>
+          <a:xfrm>
+            <a:off x="8744771" y="5228668"/>
+            <a:ext cx="2130458" cy="369332"/>
+          </a:xfrm>
+          <a:prstGeom prst="rect">
+            <a:avLst/>
+          </a:prstGeom>
+          <a:noFill/>
+        </p:spPr>
+        <p:txBody>
+          <a:bodyPr wrap="square" rtlCol="0">
+            <a:spAutoFit/>
+          </a:bodyPr>
+          <a:lstStyle/>
+          <a:p>
+            <a:r>
+              <a:rPr lang="de-DE" dirty="0"/>
+              <a:t>Source: Wikipedia</a:t>
+            </a:r>
+          </a:p>
+        </p:txBody>
+      </p:sp>
     </p:spTree>
   </p:cSld>
   <p:clrMapOvr>
@@ -14343,7 +14390,7 @@
         <p:fade/>
       </p:transition>
     </mc:Choice>
-    <mc:Fallback xmlns:p15="http://schemas.microsoft.com/office/powerpoint/2012/main" xmlns="">
+    <mc:Fallback xmlns="" xmlns:p15="http://schemas.microsoft.com/office/powerpoint/2012/main">
       <p:transition spd="med">
         <p:fade/>
       </p:transition>
@@ -14619,7 +14666,7 @@
         <p:fade/>
       </p:transition>
     </mc:Choice>
-    <mc:Fallback xmlns:p15="http://schemas.microsoft.com/office/powerpoint/2012/main" xmlns="">
+    <mc:Fallback xmlns="" xmlns:p15="http://schemas.microsoft.com/office/powerpoint/2012/main">
       <p:transition spd="med">
         <p:fade/>
       </p:transition>

</xml_diff>

<commit_message>
updated viruses/encryption schema part
</commit_message>
<xml_diff>
--- a/Reverse Engineering.pptx
+++ b/Reverse Engineering.pptx
@@ -6767,7 +6767,7 @@
                 </a:solidFill>
                 <a:latin typeface="Calibri"/>
               </a:rPr>
-              <a:t>09.11.2021</a:t>
+              <a:t>10.11.2021</a:t>
             </a:fld>
             <a:endParaRPr lang="en-GB" sz="1100" b="0" strike="noStrike" spc="-1">
               <a:latin typeface="Times New Roman"/>
@@ -7852,7 +7852,7 @@
                 </a:solidFill>
                 <a:latin typeface="Calibri"/>
               </a:rPr>
-              <a:t>09.11.2021</a:t>
+              <a:t>10.11.2021</a:t>
             </a:fld>
             <a:endParaRPr lang="en-GB" sz="1100" b="0" strike="noStrike" spc="-1">
               <a:latin typeface="Times New Roman"/>
@@ -8757,7 +8757,7 @@
                 </a:solidFill>
                 <a:latin typeface="Calibri"/>
               </a:rPr>
-              <a:t>09.11.2021</a:t>
+              <a:t>10.11.2021</a:t>
             </a:fld>
             <a:endParaRPr lang="en-GB" sz="1100" b="0" strike="noStrike" spc="-1">
               <a:latin typeface="Times New Roman"/>
@@ -9267,7 +9267,7 @@
         <p:fade/>
       </p:transition>
     </mc:Choice>
-    <mc:Fallback xmlns="" xmlns:p15="http://schemas.microsoft.com/office/powerpoint/2012/main">
+    <mc:Fallback xmlns:p15="http://schemas.microsoft.com/office/powerpoint/2012/main" xmlns="">
       <p:transition spd="med">
         <p:fade/>
       </p:transition>
@@ -9492,7 +9492,7 @@
         <p:fade/>
       </p:transition>
     </mc:Choice>
-    <mc:Fallback xmlns="" xmlns:p15="http://schemas.microsoft.com/office/powerpoint/2012/main">
+    <mc:Fallback xmlns:p15="http://schemas.microsoft.com/office/powerpoint/2012/main" xmlns="">
       <p:transition spd="med">
         <p:fade/>
       </p:transition>
@@ -9791,7 +9791,7 @@
         <p:fade/>
       </p:transition>
     </mc:Choice>
-    <mc:Fallback xmlns="" xmlns:p15="http://schemas.microsoft.com/office/powerpoint/2012/main">
+    <mc:Fallback xmlns:p15="http://schemas.microsoft.com/office/powerpoint/2012/main" xmlns="">
       <p:transition spd="med">
         <p:fade/>
       </p:transition>
@@ -10240,7 +10240,7 @@
         <p:fade/>
       </p:transition>
     </mc:Choice>
-    <mc:Fallback xmlns="" xmlns:p15="http://schemas.microsoft.com/office/powerpoint/2012/main">
+    <mc:Fallback xmlns:p15="http://schemas.microsoft.com/office/powerpoint/2012/main" xmlns="">
       <p:transition spd="med">
         <p:fade/>
       </p:transition>
@@ -10354,58 +10354,103 @@
               <a:buChar char=""/>
             </a:pPr>
             <a:r>
-              <a:rPr lang="de-DE" sz="2400" b="0" strike="noStrike" spc="-1" dirty="0" err="1">
-                <a:solidFill>
-                  <a:srgbClr val="000000"/>
-                </a:solidFill>
-                <a:latin typeface="Calibri"/>
-              </a:rPr>
-              <a:t>Example</a:t>
-            </a:r>
-            <a:r>
-              <a:rPr lang="de-DE" sz="2400" b="0" strike="noStrike" spc="-1" dirty="0">
-                <a:solidFill>
-                  <a:srgbClr val="000000"/>
-                </a:solidFill>
-                <a:latin typeface="Calibri"/>
-              </a:rPr>
-              <a:t>: RAT File (Remote </a:t>
-            </a:r>
-            <a:r>
-              <a:rPr lang="de-DE" sz="2400" b="0" strike="noStrike" spc="-1" dirty="0" err="1">
-                <a:solidFill>
-                  <a:srgbClr val="000000"/>
-                </a:solidFill>
-                <a:latin typeface="Calibri"/>
-              </a:rPr>
-              <a:t>administration</a:t>
-            </a:r>
-            <a:r>
-              <a:rPr lang="de-DE" sz="2400" b="0" strike="noStrike" spc="-1" dirty="0">
-                <a:solidFill>
-                  <a:srgbClr val="000000"/>
-                </a:solidFill>
-                <a:latin typeface="Calibri"/>
-              </a:rPr>
-              <a:t> </a:t>
-            </a:r>
-            <a:r>
-              <a:rPr lang="de-DE" sz="2400" b="0" strike="noStrike" spc="-1" dirty="0" err="1">
-                <a:solidFill>
-                  <a:srgbClr val="000000"/>
-                </a:solidFill>
-                <a:latin typeface="Calibri"/>
-              </a:rPr>
-              <a:t>tool</a:t>
-            </a:r>
-            <a:r>
-              <a:rPr lang="de-DE" sz="2400" b="0" strike="noStrike" spc="-1" dirty="0">
-                <a:solidFill>
-                  <a:srgbClr val="000000"/>
-                </a:solidFill>
-                <a:latin typeface="Calibri"/>
-              </a:rPr>
-              <a:t>)</a:t>
+              <a:rPr lang="de-DE" sz="2000" b="0" strike="noStrike" spc="-1" dirty="0">
+                <a:solidFill>
+                  <a:srgbClr val="000000"/>
+                </a:solidFill>
+                <a:latin typeface="Calibri"/>
+              </a:rPr>
+              <a:t>Analyze all </a:t>
+            </a:r>
+            <a:r>
+              <a:rPr lang="de-DE" sz="2000" b="0" strike="noStrike" spc="-1" dirty="0" err="1">
+                <a:solidFill>
+                  <a:srgbClr val="000000"/>
+                </a:solidFill>
+                <a:latin typeface="Calibri"/>
+              </a:rPr>
+              <a:t>kinds</a:t>
+            </a:r>
+            <a:r>
+              <a:rPr lang="de-DE" sz="2000" b="0" strike="noStrike" spc="-1" dirty="0">
+                <a:solidFill>
+                  <a:srgbClr val="000000"/>
+                </a:solidFill>
+                <a:latin typeface="Calibri"/>
+              </a:rPr>
+              <a:t> of </a:t>
+            </a:r>
+            <a:r>
+              <a:rPr lang="de-DE" sz="2000" b="0" strike="noStrike" spc="-1" dirty="0" err="1">
+                <a:solidFill>
+                  <a:srgbClr val="000000"/>
+                </a:solidFill>
+                <a:latin typeface="Calibri"/>
+              </a:rPr>
+              <a:t>viruses</a:t>
+            </a:r>
+            <a:r>
+              <a:rPr lang="de-DE" sz="2000" b="0" strike="noStrike" spc="-1" dirty="0">
+                <a:solidFill>
+                  <a:srgbClr val="000000"/>
+                </a:solidFill>
+                <a:latin typeface="Calibri"/>
+              </a:rPr>
+              <a:t> (e.g. RAT – File (Remote </a:t>
+            </a:r>
+            <a:r>
+              <a:rPr lang="de-DE" sz="2000" spc="-1" dirty="0">
+                <a:solidFill>
+                  <a:srgbClr val="000000"/>
+                </a:solidFill>
+                <a:latin typeface="Calibri"/>
+              </a:rPr>
+              <a:t>A</a:t>
+            </a:r>
+            <a:r>
+              <a:rPr lang="de-DE" sz="2000" b="0" strike="noStrike" spc="-1" dirty="0">
+                <a:solidFill>
+                  <a:srgbClr val="000000"/>
+                </a:solidFill>
+                <a:latin typeface="Calibri"/>
+              </a:rPr>
+              <a:t>ccess </a:t>
+            </a:r>
+            <a:r>
+              <a:rPr lang="de-DE" sz="2000" spc="-1" dirty="0">
+                <a:solidFill>
+                  <a:srgbClr val="000000"/>
+                </a:solidFill>
+                <a:latin typeface="Calibri"/>
+              </a:rPr>
+              <a:t>T</a:t>
+            </a:r>
+            <a:r>
+              <a:rPr lang="de-DE" sz="2000" b="0" strike="noStrike" spc="-1" dirty="0">
+                <a:solidFill>
+                  <a:srgbClr val="000000"/>
+                </a:solidFill>
+                <a:latin typeface="Calibri"/>
+              </a:rPr>
+              <a:t>rojan, </a:t>
+            </a:r>
+            <a:r>
+              <a:rPr lang="de-DE" sz="2000" b="0" strike="noStrike" spc="-1" dirty="0" err="1">
+                <a:solidFill>
+                  <a:srgbClr val="000000"/>
+                </a:solidFill>
+                <a:latin typeface="Calibri"/>
+              </a:rPr>
+              <a:t>WannaCry</a:t>
+            </a:r>
+            <a:r>
+              <a:rPr lang="de-DE" sz="2000" b="0" strike="noStrike" spc="-1" dirty="0">
+                <a:solidFill>
+                  <a:srgbClr val="000000"/>
+                </a:solidFill>
+                <a:latin typeface="Calibri"/>
+              </a:rPr>
+              <a:t>, etc.)</a:t>
             </a:r>
           </a:p>
           <a:p>
@@ -10424,53 +10469,213 @@
               <a:buChar char=""/>
             </a:pPr>
             <a:r>
-              <a:rPr lang="de-DE" sz="2400" b="0" strike="noStrike" spc="-1" dirty="0" err="1">
-                <a:solidFill>
-                  <a:srgbClr val="000000"/>
-                </a:solidFill>
-                <a:latin typeface="Calibri"/>
-              </a:rPr>
-              <a:t>Might</a:t>
-            </a:r>
-            <a:r>
-              <a:rPr lang="de-DE" sz="2400" b="0" strike="noStrike" spc="-1" dirty="0">
-                <a:solidFill>
-                  <a:srgbClr val="000000"/>
-                </a:solidFill>
-                <a:latin typeface="Calibri"/>
-              </a:rPr>
-              <a:t> do </a:t>
-            </a:r>
-            <a:r>
-              <a:rPr lang="de-DE" sz="2400" b="0" strike="noStrike" spc="-1" dirty="0" err="1">
-                <a:solidFill>
-                  <a:srgbClr val="000000"/>
-                </a:solidFill>
-                <a:latin typeface="Calibri"/>
-              </a:rPr>
-              <a:t>sth</a:t>
-            </a:r>
-            <a:r>
-              <a:rPr lang="de-DE" sz="2400" b="0" strike="noStrike" spc="-1" dirty="0">
-                <a:solidFill>
-                  <a:srgbClr val="000000"/>
-                </a:solidFill>
-                <a:latin typeface="Calibri"/>
-              </a:rPr>
-              <a:t> with: </a:t>
-            </a:r>
-            <a:r>
-              <a:rPr lang="de-DE" sz="2400" b="0" u="sng" strike="noStrike" spc="-1" dirty="0">
-                <a:solidFill>
-                  <a:srgbClr val="F7B615"/>
-                </a:solidFill>
-                <a:uFillTx/>
-                <a:latin typeface="Calibri"/>
-                <a:hlinkClick r:id="rId3"/>
-              </a:rPr>
-              <a:t>https://blogs.blackberry.com/en/2019/07/an-introduction-to-code-analysis-with-ghidra</a:t>
-            </a:r>
-            <a:endParaRPr lang="de-DE" sz="2400" b="0" strike="noStrike" spc="-1" dirty="0">
+              <a:rPr lang="de-DE" sz="2000" spc="-1" dirty="0">
+                <a:solidFill>
+                  <a:srgbClr val="000000"/>
+                </a:solidFill>
+                <a:latin typeface="Calibri"/>
+              </a:rPr>
+              <a:t>RAT – File: Find out what </a:t>
+            </a:r>
+            <a:r>
+              <a:rPr lang="de-DE" sz="2000" spc="-1" dirty="0" err="1">
+                <a:solidFill>
+                  <a:srgbClr val="000000"/>
+                </a:solidFill>
+                <a:latin typeface="Calibri"/>
+              </a:rPr>
+              <a:t>it</a:t>
+            </a:r>
+            <a:r>
+              <a:rPr lang="de-DE" sz="2000" spc="-1" dirty="0">
+                <a:solidFill>
+                  <a:srgbClr val="000000"/>
+                </a:solidFill>
+                <a:latin typeface="Calibri"/>
+              </a:rPr>
+              <a:t> </a:t>
+            </a:r>
+            <a:r>
+              <a:rPr lang="de-DE" sz="2000" spc="-1" dirty="0" err="1">
+                <a:solidFill>
+                  <a:srgbClr val="000000"/>
+                </a:solidFill>
+                <a:latin typeface="Calibri"/>
+              </a:rPr>
+              <a:t>is</a:t>
+            </a:r>
+            <a:r>
+              <a:rPr lang="de-DE" sz="2000" spc="-1" dirty="0">
+                <a:solidFill>
+                  <a:srgbClr val="000000"/>
+                </a:solidFill>
+                <a:latin typeface="Calibri"/>
+              </a:rPr>
+              <a:t> doing. (Most </a:t>
+            </a:r>
+            <a:r>
+              <a:rPr lang="de-DE" sz="2000" spc="-1" dirty="0" err="1">
+                <a:solidFill>
+                  <a:srgbClr val="000000"/>
+                </a:solidFill>
+                <a:latin typeface="Calibri"/>
+              </a:rPr>
+              <a:t>commonly</a:t>
+            </a:r>
+            <a:r>
+              <a:rPr lang="de-DE" sz="2000" spc="-1" dirty="0">
+                <a:solidFill>
+                  <a:srgbClr val="000000"/>
+                </a:solidFill>
+                <a:latin typeface="Calibri"/>
+              </a:rPr>
+              <a:t> </a:t>
+            </a:r>
+            <a:r>
+              <a:rPr lang="de-DE" sz="2000" spc="-1" dirty="0" err="1">
+                <a:solidFill>
+                  <a:srgbClr val="000000"/>
+                </a:solidFill>
+                <a:latin typeface="Calibri"/>
+              </a:rPr>
+              <a:t>it</a:t>
+            </a:r>
+            <a:r>
+              <a:rPr lang="de-DE" sz="2000" spc="-1" dirty="0">
+                <a:solidFill>
+                  <a:srgbClr val="000000"/>
+                </a:solidFill>
+                <a:latin typeface="Calibri"/>
+              </a:rPr>
+              <a:t> </a:t>
+            </a:r>
+            <a:r>
+              <a:rPr lang="de-DE" sz="2000" spc="-1" dirty="0" err="1">
+                <a:solidFill>
+                  <a:srgbClr val="000000"/>
+                </a:solidFill>
+                <a:latin typeface="Calibri"/>
+              </a:rPr>
+              <a:t>tries</a:t>
+            </a:r>
+            <a:r>
+              <a:rPr lang="de-DE" sz="2000" spc="-1" dirty="0">
+                <a:solidFill>
+                  <a:srgbClr val="000000"/>
+                </a:solidFill>
+                <a:latin typeface="Calibri"/>
+              </a:rPr>
+              <a:t> to </a:t>
+            </a:r>
+            <a:r>
+              <a:rPr lang="de-DE" sz="2000" spc="-1" dirty="0" err="1">
+                <a:solidFill>
+                  <a:srgbClr val="000000"/>
+                </a:solidFill>
+                <a:latin typeface="Calibri"/>
+              </a:rPr>
+              <a:t>disable</a:t>
+            </a:r>
+            <a:r>
+              <a:rPr lang="de-DE" sz="2000" spc="-1" dirty="0">
+                <a:solidFill>
+                  <a:srgbClr val="000000"/>
+                </a:solidFill>
+                <a:latin typeface="Calibri"/>
+              </a:rPr>
+              <a:t> User Account Control (UAC) </a:t>
+            </a:r>
+            <a:r>
+              <a:rPr lang="de-DE" sz="2000" spc="-1" dirty="0" err="1">
+                <a:solidFill>
+                  <a:srgbClr val="000000"/>
+                </a:solidFill>
+                <a:latin typeface="Calibri"/>
+              </a:rPr>
+              <a:t>by</a:t>
+            </a:r>
+            <a:r>
+              <a:rPr lang="de-DE" sz="2000" spc="-1" dirty="0">
+                <a:solidFill>
+                  <a:srgbClr val="000000"/>
+                </a:solidFill>
+                <a:latin typeface="Calibri"/>
+              </a:rPr>
+              <a:t> </a:t>
+            </a:r>
+            <a:r>
+              <a:rPr lang="de-DE" sz="2000" spc="-1" dirty="0" err="1">
+                <a:solidFill>
+                  <a:srgbClr val="000000"/>
+                </a:solidFill>
+                <a:latin typeface="Calibri"/>
+              </a:rPr>
+              <a:t>modifying</a:t>
+            </a:r>
+            <a:r>
+              <a:rPr lang="de-DE" sz="2000" spc="-1" dirty="0">
+                <a:solidFill>
+                  <a:srgbClr val="000000"/>
+                </a:solidFill>
+                <a:latin typeface="Calibri"/>
+              </a:rPr>
+              <a:t> </a:t>
+            </a:r>
+            <a:r>
+              <a:rPr lang="de-DE" sz="2000" spc="-1" dirty="0" err="1">
+                <a:solidFill>
+                  <a:srgbClr val="000000"/>
+                </a:solidFill>
+                <a:latin typeface="Calibri"/>
+              </a:rPr>
+              <a:t>values</a:t>
+            </a:r>
+            <a:r>
+              <a:rPr lang="de-DE" sz="2000" spc="-1" dirty="0">
+                <a:solidFill>
+                  <a:srgbClr val="000000"/>
+                </a:solidFill>
+                <a:latin typeface="Calibri"/>
+              </a:rPr>
+              <a:t> in </a:t>
+            </a:r>
+            <a:r>
+              <a:rPr lang="de-DE" sz="2000" spc="-1" dirty="0" err="1">
+                <a:solidFill>
+                  <a:srgbClr val="000000"/>
+                </a:solidFill>
+                <a:latin typeface="Calibri"/>
+              </a:rPr>
+              <a:t>the</a:t>
+            </a:r>
+            <a:r>
+              <a:rPr lang="de-DE" sz="2000" spc="-1" dirty="0">
+                <a:solidFill>
+                  <a:srgbClr val="000000"/>
+                </a:solidFill>
+                <a:latin typeface="Calibri"/>
+              </a:rPr>
+              <a:t> </a:t>
+            </a:r>
+            <a:r>
+              <a:rPr lang="de-DE" sz="2000" spc="-1" dirty="0" err="1">
+                <a:solidFill>
+                  <a:srgbClr val="000000"/>
+                </a:solidFill>
+                <a:latin typeface="Calibri"/>
+              </a:rPr>
+              <a:t>registry</a:t>
+            </a:r>
+            <a:r>
+              <a:rPr lang="de-DE" sz="2000" spc="-1" dirty="0">
+                <a:solidFill>
+                  <a:srgbClr val="000000"/>
+                </a:solidFill>
+                <a:latin typeface="Calibri"/>
+              </a:rPr>
+              <a:t>)</a:t>
+            </a:r>
+            <a:endParaRPr lang="de-DE" sz="2000" b="0" strike="noStrike" spc="-1" dirty="0">
               <a:solidFill>
                 <a:srgbClr val="000000"/>
               </a:solidFill>
@@ -10493,16 +10698,52 @@
               <a:buChar char=""/>
             </a:pPr>
             <a:r>
-              <a:rPr lang="de-DE" sz="2400" b="0" strike="noStrike" spc="-1" dirty="0" err="1">
-                <a:solidFill>
-                  <a:srgbClr val="000000"/>
-                </a:solidFill>
-                <a:latin typeface="Calibri"/>
-              </a:rPr>
-              <a:t>Might</a:t>
-            </a:r>
-            <a:r>
-              <a:rPr lang="de-DE" sz="2400" b="0" strike="noStrike" spc="-1" dirty="0">
+              <a:rPr lang="de-DE" sz="2000" spc="-1" dirty="0" err="1">
+                <a:solidFill>
+                  <a:srgbClr val="000000"/>
+                </a:solidFill>
+                <a:latin typeface="Calibri"/>
+              </a:rPr>
+              <a:t>WannaCry</a:t>
+            </a:r>
+            <a:r>
+              <a:rPr lang="de-DE" sz="2000" spc="-1" dirty="0">
+                <a:solidFill>
+                  <a:srgbClr val="000000"/>
+                </a:solidFill>
+                <a:latin typeface="Calibri"/>
+              </a:rPr>
+              <a:t>: Find </a:t>
+            </a:r>
+            <a:r>
+              <a:rPr lang="de-DE" sz="2000" spc="-1" dirty="0" err="1">
+                <a:solidFill>
+                  <a:srgbClr val="000000"/>
+                </a:solidFill>
+                <a:latin typeface="Calibri"/>
+              </a:rPr>
+              <a:t>the</a:t>
+            </a:r>
+            <a:r>
+              <a:rPr lang="de-DE" sz="2000" spc="-1" dirty="0">
+                <a:solidFill>
+                  <a:srgbClr val="000000"/>
+                </a:solidFill>
+                <a:latin typeface="Calibri"/>
+              </a:rPr>
+              <a:t> kill switch. (The </a:t>
+            </a:r>
+            <a:r>
+              <a:rPr lang="de-DE" sz="2000" spc="-1" dirty="0" err="1">
+                <a:solidFill>
+                  <a:srgbClr val="000000"/>
+                </a:solidFill>
+                <a:latin typeface="Calibri"/>
+              </a:rPr>
+              <a:t>program</a:t>
+            </a:r>
+            <a:r>
+              <a:rPr lang="de-DE" sz="2000" spc="-1" dirty="0">
                 <a:solidFill>
                   <a:srgbClr val="000000"/>
                 </a:solidFill>
@@ -10511,32 +10752,681 @@
               <a:t> </a:t>
             </a:r>
             <a:r>
-              <a:rPr lang="de-DE" sz="2400" b="0" strike="noStrike" spc="-1" dirty="0" err="1">
-                <a:solidFill>
-                  <a:srgbClr val="000000"/>
-                </a:solidFill>
-                <a:latin typeface="Calibri"/>
-              </a:rPr>
-              <a:t>add</a:t>
-            </a:r>
-            <a:r>
-              <a:rPr lang="de-DE" sz="2400" b="0" strike="noStrike" spc="-1" dirty="0">
-                <a:solidFill>
-                  <a:srgbClr val="000000"/>
-                </a:solidFill>
-                <a:latin typeface="Calibri"/>
-              </a:rPr>
-              <a:t> some </a:t>
-            </a:r>
-            <a:r>
-              <a:rPr lang="de-DE" sz="2400" b="0" strike="noStrike" spc="-1" dirty="0" err="1">
-                <a:solidFill>
-                  <a:srgbClr val="000000"/>
-                </a:solidFill>
-                <a:latin typeface="Calibri"/>
-              </a:rPr>
-              <a:t>pictures</a:t>
-            </a:r>
+              <a:rPr lang="de-DE" sz="2000" spc="-1" dirty="0" err="1">
+                <a:solidFill>
+                  <a:srgbClr val="000000"/>
+                </a:solidFill>
+                <a:latin typeface="Calibri"/>
+              </a:rPr>
+              <a:t>tried</a:t>
+            </a:r>
+            <a:r>
+              <a:rPr lang="de-DE" sz="2000" spc="-1" dirty="0">
+                <a:solidFill>
+                  <a:srgbClr val="000000"/>
+                </a:solidFill>
+                <a:latin typeface="Calibri"/>
+              </a:rPr>
+              <a:t> to </a:t>
+            </a:r>
+            <a:r>
+              <a:rPr lang="de-DE" sz="2000" spc="-1" dirty="0" err="1">
+                <a:solidFill>
+                  <a:srgbClr val="000000"/>
+                </a:solidFill>
+                <a:latin typeface="Calibri"/>
+              </a:rPr>
+              <a:t>reach</a:t>
+            </a:r>
+            <a:r>
+              <a:rPr lang="de-DE" sz="2000" spc="-1" dirty="0">
+                <a:solidFill>
+                  <a:srgbClr val="000000"/>
+                </a:solidFill>
+                <a:latin typeface="Calibri"/>
+              </a:rPr>
+              <a:t> a </a:t>
+            </a:r>
+            <a:r>
+              <a:rPr lang="de-DE" sz="2000" spc="-1" dirty="0" err="1">
+                <a:solidFill>
+                  <a:srgbClr val="000000"/>
+                </a:solidFill>
+                <a:latin typeface="Calibri"/>
+              </a:rPr>
+              <a:t>specific</a:t>
+            </a:r>
+            <a:r>
+              <a:rPr lang="de-DE" sz="2000" spc="-1" dirty="0">
+                <a:solidFill>
+                  <a:srgbClr val="000000"/>
+                </a:solidFill>
+                <a:latin typeface="Calibri"/>
+              </a:rPr>
+              <a:t> </a:t>
+            </a:r>
+            <a:r>
+              <a:rPr lang="de-DE" sz="2000" spc="-1" dirty="0" err="1">
+                <a:solidFill>
+                  <a:srgbClr val="000000"/>
+                </a:solidFill>
+                <a:latin typeface="Calibri"/>
+              </a:rPr>
+              <a:t>domain</a:t>
+            </a:r>
+            <a:r>
+              <a:rPr lang="de-DE" sz="2000" spc="-1" dirty="0">
+                <a:solidFill>
+                  <a:srgbClr val="000000"/>
+                </a:solidFill>
+                <a:latin typeface="Calibri"/>
+              </a:rPr>
+              <a:t>, </a:t>
+            </a:r>
+            <a:r>
+              <a:rPr lang="de-DE" sz="2000" spc="-1" dirty="0" err="1">
+                <a:solidFill>
+                  <a:srgbClr val="000000"/>
+                </a:solidFill>
+                <a:latin typeface="Calibri"/>
+              </a:rPr>
+              <a:t>if</a:t>
+            </a:r>
+            <a:r>
+              <a:rPr lang="de-DE" sz="2000" spc="-1" dirty="0">
+                <a:solidFill>
+                  <a:srgbClr val="000000"/>
+                </a:solidFill>
+                <a:latin typeface="Calibri"/>
+              </a:rPr>
+              <a:t> </a:t>
+            </a:r>
+            <a:r>
+              <a:rPr lang="de-DE" sz="2000" spc="-1" dirty="0" err="1">
+                <a:solidFill>
+                  <a:srgbClr val="000000"/>
+                </a:solidFill>
+                <a:latin typeface="Calibri"/>
+              </a:rPr>
+              <a:t>the</a:t>
+            </a:r>
+            <a:r>
+              <a:rPr lang="de-DE" sz="2000" spc="-1" dirty="0">
+                <a:solidFill>
+                  <a:srgbClr val="000000"/>
+                </a:solidFill>
+                <a:latin typeface="Calibri"/>
+              </a:rPr>
+              <a:t> </a:t>
+            </a:r>
+            <a:r>
+              <a:rPr lang="de-DE" sz="2000" spc="-1" dirty="0" err="1">
+                <a:solidFill>
+                  <a:srgbClr val="000000"/>
+                </a:solidFill>
+                <a:latin typeface="Calibri"/>
+              </a:rPr>
+              <a:t>domain</a:t>
+            </a:r>
+            <a:r>
+              <a:rPr lang="de-DE" sz="2000" spc="-1" dirty="0">
+                <a:solidFill>
+                  <a:srgbClr val="000000"/>
+                </a:solidFill>
+                <a:latin typeface="Calibri"/>
+              </a:rPr>
+              <a:t> </a:t>
+            </a:r>
+            <a:r>
+              <a:rPr lang="de-DE" sz="2000" spc="-1" dirty="0" err="1">
+                <a:solidFill>
+                  <a:srgbClr val="000000"/>
+                </a:solidFill>
+                <a:latin typeface="Calibri"/>
+              </a:rPr>
+              <a:t>is</a:t>
+            </a:r>
+            <a:r>
+              <a:rPr lang="de-DE" sz="2000" spc="-1" dirty="0">
+                <a:solidFill>
+                  <a:srgbClr val="000000"/>
+                </a:solidFill>
+                <a:latin typeface="Calibri"/>
+              </a:rPr>
+              <a:t> </a:t>
+            </a:r>
+            <a:r>
+              <a:rPr lang="de-DE" sz="2000" spc="-1" dirty="0" err="1">
+                <a:solidFill>
+                  <a:srgbClr val="000000"/>
+                </a:solidFill>
+                <a:latin typeface="Calibri"/>
+              </a:rPr>
+              <a:t>unassigned</a:t>
+            </a:r>
+            <a:r>
+              <a:rPr lang="de-DE" sz="2000" spc="-1" dirty="0">
+                <a:solidFill>
+                  <a:srgbClr val="000000"/>
+                </a:solidFill>
+                <a:latin typeface="Calibri"/>
+              </a:rPr>
+              <a:t> </a:t>
+            </a:r>
+            <a:r>
+              <a:rPr lang="de-DE" sz="2000" spc="-1" dirty="0" err="1">
+                <a:solidFill>
+                  <a:srgbClr val="000000"/>
+                </a:solidFill>
+                <a:latin typeface="Calibri"/>
+              </a:rPr>
+              <a:t>the</a:t>
+            </a:r>
+            <a:r>
+              <a:rPr lang="de-DE" sz="2000" spc="-1" dirty="0">
+                <a:solidFill>
+                  <a:srgbClr val="000000"/>
+                </a:solidFill>
+                <a:latin typeface="Calibri"/>
+              </a:rPr>
+              <a:t> </a:t>
+            </a:r>
+            <a:r>
+              <a:rPr lang="de-DE" sz="2000" spc="-1" dirty="0" err="1">
+                <a:solidFill>
+                  <a:srgbClr val="000000"/>
+                </a:solidFill>
+                <a:latin typeface="Calibri"/>
+              </a:rPr>
+              <a:t>program</a:t>
+            </a:r>
+            <a:r>
+              <a:rPr lang="de-DE" sz="2000" spc="-1" dirty="0">
+                <a:solidFill>
+                  <a:srgbClr val="000000"/>
+                </a:solidFill>
+                <a:latin typeface="Calibri"/>
+              </a:rPr>
+              <a:t> </a:t>
+            </a:r>
+            <a:r>
+              <a:rPr lang="de-DE" sz="2000" spc="-1" dirty="0" err="1">
+                <a:solidFill>
+                  <a:srgbClr val="000000"/>
+                </a:solidFill>
+                <a:latin typeface="Calibri"/>
+              </a:rPr>
+              <a:t>kept</a:t>
+            </a:r>
+            <a:r>
+              <a:rPr lang="de-DE" sz="2000" spc="-1" dirty="0">
+                <a:solidFill>
+                  <a:srgbClr val="000000"/>
+                </a:solidFill>
+                <a:latin typeface="Calibri"/>
+              </a:rPr>
+              <a:t> </a:t>
+            </a:r>
+            <a:r>
+              <a:rPr lang="de-DE" sz="2000" spc="-1" dirty="0" err="1">
+                <a:solidFill>
+                  <a:srgbClr val="000000"/>
+                </a:solidFill>
+                <a:latin typeface="Calibri"/>
+              </a:rPr>
+              <a:t>going</a:t>
+            </a:r>
+            <a:r>
+              <a:rPr lang="de-DE" sz="2000" spc="-1" dirty="0">
+                <a:solidFill>
+                  <a:srgbClr val="000000"/>
+                </a:solidFill>
+                <a:latin typeface="Calibri"/>
+              </a:rPr>
+              <a:t>, </a:t>
+            </a:r>
+            <a:r>
+              <a:rPr lang="de-DE" sz="2000" spc="-1" dirty="0" err="1">
+                <a:solidFill>
+                  <a:srgbClr val="000000"/>
+                </a:solidFill>
+                <a:latin typeface="Calibri"/>
+              </a:rPr>
+              <a:t>if</a:t>
+            </a:r>
+            <a:r>
+              <a:rPr lang="de-DE" sz="2000" spc="-1" dirty="0">
+                <a:solidFill>
+                  <a:srgbClr val="000000"/>
+                </a:solidFill>
+                <a:latin typeface="Calibri"/>
+              </a:rPr>
+              <a:t> </a:t>
+            </a:r>
+            <a:r>
+              <a:rPr lang="de-DE" sz="2000" spc="-1" dirty="0" err="1">
+                <a:solidFill>
+                  <a:srgbClr val="000000"/>
+                </a:solidFill>
+                <a:latin typeface="Calibri"/>
+              </a:rPr>
+              <a:t>assigned</a:t>
+            </a:r>
+            <a:r>
+              <a:rPr lang="de-DE" sz="2000" spc="-1" dirty="0">
+                <a:solidFill>
+                  <a:srgbClr val="000000"/>
+                </a:solidFill>
+                <a:latin typeface="Calibri"/>
+              </a:rPr>
+              <a:t> </a:t>
+            </a:r>
+            <a:r>
+              <a:rPr lang="de-DE" sz="2000" spc="-1" dirty="0" err="1">
+                <a:solidFill>
+                  <a:srgbClr val="000000"/>
+                </a:solidFill>
+                <a:latin typeface="Calibri"/>
+              </a:rPr>
+              <a:t>the</a:t>
+            </a:r>
+            <a:r>
+              <a:rPr lang="de-DE" sz="2000" spc="-1" dirty="0">
+                <a:solidFill>
+                  <a:srgbClr val="000000"/>
+                </a:solidFill>
+                <a:latin typeface="Calibri"/>
+              </a:rPr>
+              <a:t> </a:t>
+            </a:r>
+            <a:r>
+              <a:rPr lang="de-DE" sz="2000" spc="-1" dirty="0" err="1">
+                <a:solidFill>
+                  <a:srgbClr val="000000"/>
+                </a:solidFill>
+                <a:latin typeface="Calibri"/>
+              </a:rPr>
+              <a:t>program</a:t>
+            </a:r>
+            <a:r>
+              <a:rPr lang="de-DE" sz="2000" spc="-1" dirty="0">
+                <a:solidFill>
+                  <a:srgbClr val="000000"/>
+                </a:solidFill>
+                <a:latin typeface="Calibri"/>
+              </a:rPr>
+              <a:t> </a:t>
+            </a:r>
+            <a:r>
+              <a:rPr lang="de-DE" sz="2000" spc="-1" dirty="0" err="1">
+                <a:solidFill>
+                  <a:srgbClr val="000000"/>
+                </a:solidFill>
+                <a:latin typeface="Calibri"/>
+              </a:rPr>
+              <a:t>stopped</a:t>
+            </a:r>
+            <a:r>
+              <a:rPr lang="de-DE" sz="2000" spc="-1" dirty="0">
+                <a:solidFill>
+                  <a:srgbClr val="000000"/>
+                </a:solidFill>
+                <a:latin typeface="Calibri"/>
+              </a:rPr>
+              <a:t> </a:t>
+            </a:r>
+            <a:r>
+              <a:rPr lang="de-DE" sz="2000" spc="-1" dirty="0" err="1">
+                <a:solidFill>
+                  <a:srgbClr val="000000"/>
+                </a:solidFill>
+                <a:latin typeface="Calibri"/>
+              </a:rPr>
+              <a:t>immediately</a:t>
+            </a:r>
+            <a:r>
+              <a:rPr lang="de-DE" sz="2000" spc="-1" dirty="0">
+                <a:solidFill>
+                  <a:srgbClr val="000000"/>
+                </a:solidFill>
+                <a:latin typeface="Calibri"/>
+              </a:rPr>
+              <a:t>)</a:t>
+            </a:r>
+          </a:p>
+          <a:p>
+            <a:pPr marL="274320" indent="-273960">
+              <a:lnSpc>
+                <a:spcPct val="90000"/>
+              </a:lnSpc>
+              <a:spcBef>
+                <a:spcPts val="1800"/>
+              </a:spcBef>
+              <a:buClr>
+                <a:srgbClr val="000000"/>
+              </a:buClr>
+              <a:buSzPct val="80000"/>
+              <a:buFont typeface="Wingdings" charset="2"/>
+              <a:buChar char=""/>
+            </a:pPr>
+            <a:r>
+              <a:rPr lang="de-DE" sz="2000" spc="-1" dirty="0">
+                <a:solidFill>
+                  <a:srgbClr val="000000"/>
+                </a:solidFill>
+                <a:latin typeface="Calibri"/>
+              </a:rPr>
+              <a:t>Encryption Schemas: Could </a:t>
+            </a:r>
+            <a:r>
+              <a:rPr lang="de-DE" sz="2000" spc="-1" dirty="0" err="1">
+                <a:solidFill>
+                  <a:srgbClr val="000000"/>
+                </a:solidFill>
+                <a:latin typeface="Calibri"/>
+              </a:rPr>
+              <a:t>be</a:t>
+            </a:r>
+            <a:r>
+              <a:rPr lang="de-DE" sz="2000" spc="-1" dirty="0">
+                <a:solidFill>
+                  <a:srgbClr val="000000"/>
+                </a:solidFill>
+                <a:latin typeface="Calibri"/>
+              </a:rPr>
+              <a:t>: </a:t>
+            </a:r>
+            <a:r>
+              <a:rPr lang="de-DE" sz="2000" spc="-1" dirty="0" err="1">
+                <a:solidFill>
+                  <a:srgbClr val="000000"/>
+                </a:solidFill>
+                <a:latin typeface="Calibri"/>
+              </a:rPr>
+              <a:t>database</a:t>
+            </a:r>
+            <a:r>
+              <a:rPr lang="de-DE" sz="2000" spc="-1" dirty="0">
+                <a:solidFill>
+                  <a:srgbClr val="000000"/>
+                </a:solidFill>
+                <a:latin typeface="Calibri"/>
+              </a:rPr>
+              <a:t> </a:t>
+            </a:r>
+            <a:r>
+              <a:rPr lang="de-DE" sz="2000" spc="-1" dirty="0" err="1">
+                <a:solidFill>
+                  <a:srgbClr val="000000"/>
+                </a:solidFill>
+                <a:latin typeface="Calibri"/>
+              </a:rPr>
+              <a:t>encryption</a:t>
+            </a:r>
+            <a:r>
+              <a:rPr lang="de-DE" sz="2000" spc="-1" dirty="0">
+                <a:solidFill>
+                  <a:srgbClr val="000000"/>
+                </a:solidFill>
+                <a:latin typeface="Calibri"/>
+              </a:rPr>
+              <a:t>, </a:t>
+            </a:r>
+            <a:r>
+              <a:rPr lang="de-DE" sz="2000" spc="-1" dirty="0" err="1">
+                <a:solidFill>
+                  <a:srgbClr val="000000"/>
+                </a:solidFill>
+                <a:latin typeface="Calibri"/>
+              </a:rPr>
+              <a:t>Plaintext</a:t>
+            </a:r>
+            <a:r>
+              <a:rPr lang="de-DE" sz="2000" spc="-1" dirty="0">
+                <a:solidFill>
+                  <a:srgbClr val="000000"/>
+                </a:solidFill>
+                <a:latin typeface="Calibri"/>
+              </a:rPr>
+              <a:t> -&gt; </a:t>
+            </a:r>
+            <a:r>
+              <a:rPr lang="de-DE" sz="2000" spc="-1" dirty="0" err="1">
+                <a:solidFill>
+                  <a:srgbClr val="000000"/>
+                </a:solidFill>
+                <a:latin typeface="Calibri"/>
+              </a:rPr>
+              <a:t>Cypertext</a:t>
+            </a:r>
+            <a:r>
+              <a:rPr lang="de-DE" sz="2000" spc="-1" dirty="0">
+                <a:solidFill>
+                  <a:srgbClr val="000000"/>
+                </a:solidFill>
+                <a:latin typeface="Calibri"/>
+              </a:rPr>
+              <a:t> with a </a:t>
+            </a:r>
+            <a:r>
+              <a:rPr lang="de-DE" sz="2000" spc="-1" dirty="0" err="1">
+                <a:solidFill>
+                  <a:srgbClr val="000000"/>
+                </a:solidFill>
+                <a:latin typeface="Calibri"/>
+              </a:rPr>
+              <a:t>session</a:t>
+            </a:r>
+            <a:r>
+              <a:rPr lang="de-DE" sz="2000" spc="-1" dirty="0">
+                <a:solidFill>
+                  <a:srgbClr val="000000"/>
+                </a:solidFill>
+                <a:latin typeface="Calibri"/>
+              </a:rPr>
+              <a:t> </a:t>
+            </a:r>
+            <a:r>
+              <a:rPr lang="de-DE" sz="2000" spc="-1" dirty="0" err="1">
+                <a:solidFill>
+                  <a:srgbClr val="000000"/>
+                </a:solidFill>
+                <a:latin typeface="Calibri"/>
+              </a:rPr>
+              <a:t>key</a:t>
+            </a:r>
+            <a:r>
+              <a:rPr lang="de-DE" sz="2000" spc="-1" dirty="0">
+                <a:solidFill>
+                  <a:srgbClr val="000000"/>
+                </a:solidFill>
+                <a:latin typeface="Calibri"/>
+              </a:rPr>
+              <a:t>, etc.</a:t>
+            </a:r>
+          </a:p>
+          <a:p>
+            <a:pPr marL="360">
+              <a:lnSpc>
+                <a:spcPct val="90000"/>
+              </a:lnSpc>
+              <a:spcBef>
+                <a:spcPts val="1800"/>
+              </a:spcBef>
+              <a:buClr>
+                <a:srgbClr val="000000"/>
+              </a:buClr>
+              <a:buSzPct val="80000"/>
+            </a:pPr>
+            <a:r>
+              <a:rPr lang="de-DE" sz="2000" spc="-1" dirty="0">
+                <a:solidFill>
+                  <a:srgbClr val="000000"/>
+                </a:solidFill>
+                <a:latin typeface="Calibri"/>
+              </a:rPr>
+              <a:t>All you </a:t>
+            </a:r>
+            <a:r>
+              <a:rPr lang="de-DE" sz="2000" spc="-1" dirty="0" err="1">
+                <a:solidFill>
+                  <a:srgbClr val="000000"/>
+                </a:solidFill>
+                <a:latin typeface="Calibri"/>
+              </a:rPr>
+              <a:t>need</a:t>
+            </a:r>
+            <a:r>
+              <a:rPr lang="de-DE" sz="2000" spc="-1" dirty="0">
+                <a:solidFill>
+                  <a:srgbClr val="000000"/>
+                </a:solidFill>
+                <a:latin typeface="Calibri"/>
+              </a:rPr>
+              <a:t> </a:t>
+            </a:r>
+            <a:r>
+              <a:rPr lang="de-DE" sz="2000" spc="-1" dirty="0" err="1">
+                <a:solidFill>
+                  <a:srgbClr val="000000"/>
+                </a:solidFill>
+                <a:latin typeface="Calibri"/>
+              </a:rPr>
+              <a:t>is</a:t>
+            </a:r>
+            <a:r>
+              <a:rPr lang="de-DE" sz="2000" spc="-1" dirty="0">
+                <a:solidFill>
+                  <a:srgbClr val="000000"/>
+                </a:solidFill>
+                <a:latin typeface="Calibri"/>
+              </a:rPr>
+              <a:t> a </a:t>
+            </a:r>
+            <a:r>
+              <a:rPr lang="de-DE" sz="2000" spc="-1" dirty="0" err="1">
+                <a:solidFill>
+                  <a:srgbClr val="000000"/>
+                </a:solidFill>
+                <a:latin typeface="Calibri"/>
+              </a:rPr>
+              <a:t>file</a:t>
+            </a:r>
+            <a:r>
+              <a:rPr lang="de-DE" sz="2000" spc="-1" dirty="0">
+                <a:solidFill>
+                  <a:srgbClr val="000000"/>
+                </a:solidFill>
+                <a:latin typeface="Calibri"/>
+              </a:rPr>
+              <a:t> that contains </a:t>
+            </a:r>
+            <a:r>
+              <a:rPr lang="de-DE" sz="2000" spc="-1" dirty="0" err="1">
+                <a:solidFill>
+                  <a:srgbClr val="000000"/>
+                </a:solidFill>
+                <a:latin typeface="Calibri"/>
+              </a:rPr>
+              <a:t>the</a:t>
+            </a:r>
+            <a:r>
+              <a:rPr lang="de-DE" sz="2000" spc="-1" dirty="0">
+                <a:solidFill>
+                  <a:srgbClr val="000000"/>
+                </a:solidFill>
+                <a:latin typeface="Calibri"/>
+              </a:rPr>
+              <a:t> </a:t>
+            </a:r>
+            <a:r>
+              <a:rPr lang="de-DE" sz="2000" spc="-1" dirty="0" err="1">
+                <a:solidFill>
+                  <a:srgbClr val="000000"/>
+                </a:solidFill>
+                <a:latin typeface="Calibri"/>
+              </a:rPr>
+              <a:t>important</a:t>
+            </a:r>
+            <a:r>
+              <a:rPr lang="de-DE" sz="2000" spc="-1" dirty="0">
+                <a:solidFill>
+                  <a:srgbClr val="000000"/>
+                </a:solidFill>
+                <a:latin typeface="Calibri"/>
+              </a:rPr>
+              <a:t> </a:t>
+            </a:r>
+            <a:r>
+              <a:rPr lang="de-DE" sz="2000" spc="-1" dirty="0" err="1">
+                <a:solidFill>
+                  <a:srgbClr val="000000"/>
+                </a:solidFill>
+                <a:latin typeface="Calibri"/>
+              </a:rPr>
+              <a:t>algorithm</a:t>
+            </a:r>
+            <a:r>
+              <a:rPr lang="de-DE" sz="2000" spc="-1" dirty="0">
+                <a:solidFill>
+                  <a:srgbClr val="000000"/>
+                </a:solidFill>
+                <a:latin typeface="Calibri"/>
+              </a:rPr>
+              <a:t> (</a:t>
+            </a:r>
+            <a:r>
+              <a:rPr lang="de-DE" sz="2000" spc="-1" dirty="0" err="1">
+                <a:solidFill>
+                  <a:srgbClr val="000000"/>
+                </a:solidFill>
+                <a:latin typeface="Calibri"/>
+              </a:rPr>
+              <a:t>Binaries</a:t>
+            </a:r>
+            <a:r>
+              <a:rPr lang="de-DE" sz="2000" spc="-1" dirty="0">
+                <a:solidFill>
+                  <a:srgbClr val="000000"/>
+                </a:solidFill>
+                <a:latin typeface="Calibri"/>
+              </a:rPr>
+              <a:t>, </a:t>
+            </a:r>
+            <a:r>
+              <a:rPr lang="de-DE" sz="2000" spc="-1" dirty="0" err="1">
+                <a:solidFill>
+                  <a:srgbClr val="000000"/>
+                </a:solidFill>
+                <a:latin typeface="Calibri"/>
+              </a:rPr>
+              <a:t>Executables</a:t>
+            </a:r>
+            <a:r>
+              <a:rPr lang="de-DE" sz="2000" spc="-1" dirty="0">
+                <a:solidFill>
+                  <a:srgbClr val="000000"/>
+                </a:solidFill>
+                <a:latin typeface="Calibri"/>
+              </a:rPr>
+              <a:t>, …)</a:t>
+            </a:r>
+          </a:p>
+          <a:p>
+            <a:pPr marL="274320" indent="-273960">
+              <a:lnSpc>
+                <a:spcPct val="90000"/>
+              </a:lnSpc>
+              <a:spcBef>
+                <a:spcPts val="1800"/>
+              </a:spcBef>
+              <a:buClr>
+                <a:srgbClr val="000000"/>
+              </a:buClr>
+              <a:buSzPct val="80000"/>
+              <a:buFont typeface="Wingdings" charset="2"/>
+              <a:buChar char=""/>
+            </a:pPr>
             <a:endParaRPr lang="de-DE" sz="2400" b="0" strike="noStrike" spc="-1" dirty="0">
               <a:solidFill>
                 <a:srgbClr val="000000"/>
@@ -10557,7 +11447,7 @@
         <p:fade/>
       </p:transition>
     </mc:Choice>
-    <mc:Fallback xmlns="" xmlns:p15="http://schemas.microsoft.com/office/powerpoint/2012/main">
+    <mc:Fallback xmlns:p15="http://schemas.microsoft.com/office/powerpoint/2012/main" xmlns="">
       <p:transition spd="med">
         <p:fade/>
       </p:transition>
@@ -10897,7 +11787,7 @@
         <p:fade/>
       </p:transition>
     </mc:Choice>
-    <mc:Fallback xmlns="" xmlns:p15="http://schemas.microsoft.com/office/powerpoint/2012/main">
+    <mc:Fallback xmlns:p15="http://schemas.microsoft.com/office/powerpoint/2012/main" xmlns="">
       <p:transition spd="med">
         <p:fade/>
       </p:transition>
@@ -11308,7 +12198,7 @@
         <p:fade/>
       </p:transition>
     </mc:Choice>
-    <mc:Fallback xmlns="" xmlns:p15="http://schemas.microsoft.com/office/powerpoint/2012/main">
+    <mc:Fallback xmlns:p15="http://schemas.microsoft.com/office/powerpoint/2012/main" xmlns="">
       <p:transition spd="med">
         <p:fade/>
       </p:transition>
@@ -11622,7 +12512,7 @@
         <p:fade/>
       </p:transition>
     </mc:Choice>
-    <mc:Fallback xmlns="" xmlns:p15="http://schemas.microsoft.com/office/powerpoint/2012/main">
+    <mc:Fallback xmlns:p15="http://schemas.microsoft.com/office/powerpoint/2012/main" xmlns="">
       <p:transition spd="med">
         <p:fade/>
       </p:transition>
@@ -11888,7 +12778,7 @@
         <p:fade/>
       </p:transition>
     </mc:Choice>
-    <mc:Fallback xmlns="" xmlns:p15="http://schemas.microsoft.com/office/powerpoint/2012/main">
+    <mc:Fallback xmlns:p15="http://schemas.microsoft.com/office/powerpoint/2012/main" xmlns="">
       <p:transition spd="med">
         <p:fade/>
       </p:transition>
@@ -12233,7 +13123,7 @@
         <p:spPr>
           <a:xfrm>
             <a:off x="1440000" y="3959999"/>
-            <a:ext cx="4680000" cy="1200329"/>
+            <a:ext cx="4680000" cy="1384995"/>
           </a:xfrm>
           <a:prstGeom prst="rect">
             <a:avLst/>
@@ -12274,10 +13164,66 @@
             <a:endParaRPr lang="de-DE" sz="2400" i="1" dirty="0"/>
           </a:p>
           <a:p>
-            <a:r>
-              <a:rPr lang="de-DE" sz="2400" dirty="0"/>
-              <a:t>- </a:t>
-            </a:r>
+            <a:pPr marL="285750" indent="-285750">
+              <a:buFontTx/>
+              <a:buChar char="-"/>
+            </a:pPr>
+            <a:r>
+              <a:rPr lang="de-DE" dirty="0"/>
+              <a:t>Your </a:t>
+            </a:r>
+            <a:r>
+              <a:rPr lang="de-DE" dirty="0" err="1"/>
+              <a:t>favourite</a:t>
+            </a:r>
+            <a:r>
+              <a:rPr lang="de-DE" dirty="0"/>
+              <a:t> </a:t>
+            </a:r>
+            <a:r>
+              <a:rPr lang="de-DE" dirty="0" err="1"/>
+              <a:t>video</a:t>
+            </a:r>
+            <a:r>
+              <a:rPr lang="de-DE" dirty="0"/>
+              <a:t> </a:t>
+            </a:r>
+            <a:r>
+              <a:rPr lang="de-DE" dirty="0" err="1"/>
+              <a:t>games</a:t>
+            </a:r>
+            <a:endParaRPr lang="de-DE" dirty="0"/>
+          </a:p>
+          <a:p>
+            <a:pPr marL="285750" indent="-285750">
+              <a:buFontTx/>
+              <a:buChar char="-"/>
+            </a:pPr>
+            <a:r>
+              <a:rPr lang="de-DE" dirty="0"/>
+              <a:t>Possible </a:t>
+            </a:r>
+            <a:r>
+              <a:rPr lang="de-DE" dirty="0" err="1"/>
+              <a:t>evidence</a:t>
+            </a:r>
+            <a:r>
+              <a:rPr lang="de-DE" dirty="0"/>
+              <a:t> in </a:t>
+            </a:r>
+            <a:r>
+              <a:rPr lang="de-DE" dirty="0" err="1"/>
+              <a:t>criminal</a:t>
+            </a:r>
+            <a:r>
+              <a:rPr lang="de-DE" dirty="0"/>
+              <a:t> </a:t>
+            </a:r>
+            <a:r>
+              <a:rPr lang="de-DE" dirty="0" err="1"/>
+              <a:t>affairs</a:t>
+            </a:r>
+            <a:endParaRPr lang="de-DE" dirty="0"/>
           </a:p>
           <a:p>
             <a:pPr algn="ctr"/>
@@ -12300,7 +13246,7 @@
         <p:spPr>
           <a:xfrm>
             <a:off x="6120000" y="3959999"/>
-            <a:ext cx="4680000" cy="1200329"/>
+            <a:ext cx="4680000" cy="1661993"/>
           </a:xfrm>
           <a:prstGeom prst="rect">
             <a:avLst/>
@@ -12328,8 +13274,33 @@
             </a:r>
           </a:p>
           <a:p>
-            <a:pPr algn="ctr"/>
-            <a:endParaRPr lang="de-DE" sz="2400" dirty="0"/>
+            <a:pPr marL="285750" indent="-285750">
+              <a:buFontTx/>
+              <a:buChar char="-"/>
+            </a:pPr>
+            <a:r>
+              <a:rPr lang="de-DE" dirty="0"/>
+              <a:t>Security </a:t>
+            </a:r>
+            <a:r>
+              <a:rPr lang="de-DE" dirty="0" err="1"/>
+              <a:t>loopholes</a:t>
+            </a:r>
+            <a:br>
+              <a:rPr lang="de-DE" dirty="0"/>
+            </a:br>
+            <a:r>
+              <a:rPr lang="de-DE" dirty="0"/>
+              <a:t>(0Day Exploits, Remote </a:t>
+            </a:r>
+            <a:r>
+              <a:rPr lang="de-DE" dirty="0" err="1"/>
+              <a:t>access</a:t>
+            </a:r>
+            <a:r>
+              <a:rPr lang="de-DE" dirty="0"/>
+              <a:t> of your OS, etc.)</a:t>
+            </a:r>
           </a:p>
           <a:p>
             <a:pPr algn="ctr"/>
@@ -12348,7 +13319,7 @@
         <p:fade/>
       </p:transition>
     </mc:Choice>
-    <mc:Fallback xmlns="" xmlns:p15="http://schemas.microsoft.com/office/powerpoint/2012/main">
+    <mc:Fallback xmlns:p15="http://schemas.microsoft.com/office/powerpoint/2012/main" xmlns="">
       <p:transition spd="med">
         <p:fade/>
       </p:transition>
@@ -13467,7 +14438,7 @@
         <p:fade/>
       </p:transition>
     </mc:Choice>
-    <mc:Fallback xmlns="" xmlns:p15="http://schemas.microsoft.com/office/powerpoint/2012/main">
+    <mc:Fallback xmlns:p15="http://schemas.microsoft.com/office/powerpoint/2012/main" xmlns="">
       <p:transition spd="med">
         <p:fade/>
       </p:transition>
@@ -13664,7 +14635,7 @@
         <p:fade/>
       </p:transition>
     </mc:Choice>
-    <mc:Fallback xmlns="" xmlns:p15="http://schemas.microsoft.com/office/powerpoint/2012/main">
+    <mc:Fallback xmlns:p15="http://schemas.microsoft.com/office/powerpoint/2012/main" xmlns="">
       <p:transition spd="med">
         <p:fade/>
       </p:transition>
@@ -13883,7 +14854,7 @@
         <p:fade/>
       </p:transition>
     </mc:Choice>
-    <mc:Fallback xmlns="" xmlns:p15="http://schemas.microsoft.com/office/powerpoint/2012/main">
+    <mc:Fallback xmlns:p15="http://schemas.microsoft.com/office/powerpoint/2012/main" xmlns="">
       <p:transition spd="med">
         <p:fade/>
       </p:transition>
@@ -14390,7 +15361,7 @@
         <p:fade/>
       </p:transition>
     </mc:Choice>
-    <mc:Fallback xmlns="" xmlns:p15="http://schemas.microsoft.com/office/powerpoint/2012/main">
+    <mc:Fallback xmlns:p15="http://schemas.microsoft.com/office/powerpoint/2012/main" xmlns="">
       <p:transition spd="med">
         <p:fade/>
       </p:transition>
@@ -14666,7 +15637,7 @@
         <p:fade/>
       </p:transition>
     </mc:Choice>
-    <mc:Fallback xmlns="" xmlns:p15="http://schemas.microsoft.com/office/powerpoint/2012/main">
+    <mc:Fallback xmlns:p15="http://schemas.microsoft.com/office/powerpoint/2012/main" xmlns="">
       <p:transition spd="med">
         <p:fade/>
       </p:transition>

</xml_diff>

<commit_message>
added some sources to their individual slide and edited the sources slide itself
</commit_message>
<xml_diff>
--- a/Reverse Engineering.pptx
+++ b/Reverse Engineering.pptx
@@ -23,7 +23,7 @@
     <p:sldId id="266" r:id="rId14"/>
     <p:sldId id="267" r:id="rId15"/>
     <p:sldId id="268" r:id="rId16"/>
-    <p:sldId id="271" r:id="rId17"/>
+    <p:sldId id="272" r:id="rId17"/>
     <p:sldId id="269" r:id="rId18"/>
     <p:sldId id="270" r:id="rId19"/>
   </p:sldIdLst>
@@ -6768,7 +6768,7 @@
                 </a:solidFill>
                 <a:latin typeface="Calibri"/>
               </a:rPr>
-              <a:t>10.11.2021</a:t>
+              <a:t>11.11.2021</a:t>
             </a:fld>
             <a:endParaRPr lang="en-GB" sz="1100" b="0" strike="noStrike" spc="-1">
               <a:latin typeface="Times New Roman"/>
@@ -7853,7 +7853,7 @@
                 </a:solidFill>
                 <a:latin typeface="Calibri"/>
               </a:rPr>
-              <a:t>10.11.2021</a:t>
+              <a:t>11.11.2021</a:t>
             </a:fld>
             <a:endParaRPr lang="en-GB" sz="1100" b="0" strike="noStrike" spc="-1">
               <a:latin typeface="Times New Roman"/>
@@ -8758,7 +8758,7 @@
                 </a:solidFill>
                 <a:latin typeface="Calibri"/>
               </a:rPr>
-              <a:t>10.11.2021</a:t>
+              <a:t>11.11.2021</a:t>
             </a:fld>
             <a:endParaRPr lang="en-GB" sz="1100" b="0" strike="noStrike" spc="-1">
               <a:latin typeface="Times New Roman"/>
@@ -9268,7 +9268,7 @@
         <p:fade/>
       </p:transition>
     </mc:Choice>
-    <mc:Fallback xmlns="" xmlns:p15="http://schemas.microsoft.com/office/powerpoint/2012/main">
+    <mc:Fallback xmlns:p15="http://schemas.microsoft.com/office/powerpoint/2012/main" xmlns="">
       <p:transition spd="med">
         <p:fade/>
       </p:transition>
@@ -9493,7 +9493,7 @@
         <p:fade/>
       </p:transition>
     </mc:Choice>
-    <mc:Fallback xmlns="" xmlns:p15="http://schemas.microsoft.com/office/powerpoint/2012/main">
+    <mc:Fallback xmlns:p15="http://schemas.microsoft.com/office/powerpoint/2012/main" xmlns="">
       <p:transition spd="med">
         <p:fade/>
       </p:transition>
@@ -9607,13 +9607,76 @@
               <a:buChar char=""/>
             </a:pPr>
             <a:r>
-              <a:rPr lang="de-DE" sz="2400" b="0" strike="noStrike" spc="-1">
-                <a:solidFill>
-                  <a:srgbClr val="000000"/>
-                </a:solidFill>
-                <a:latin typeface="Calibri"/>
-              </a:rPr>
-              <a:t>Released as a free, open source software on 5th of March 2019</a:t>
+              <a:rPr lang="de-DE" sz="2400" b="0" strike="noStrike" spc="-1" dirty="0" err="1">
+                <a:solidFill>
+                  <a:srgbClr val="000000"/>
+                </a:solidFill>
+                <a:latin typeface="Calibri"/>
+              </a:rPr>
+              <a:t>Released</a:t>
+            </a:r>
+            <a:r>
+              <a:rPr lang="de-DE" sz="2400" b="0" strike="noStrike" spc="-1" dirty="0">
+                <a:solidFill>
+                  <a:srgbClr val="000000"/>
+                </a:solidFill>
+                <a:latin typeface="Calibri"/>
+              </a:rPr>
+              <a:t> </a:t>
+            </a:r>
+            <a:r>
+              <a:rPr lang="de-DE" sz="2400" b="0" strike="noStrike" spc="-1" dirty="0" err="1">
+                <a:solidFill>
+                  <a:srgbClr val="000000"/>
+                </a:solidFill>
+                <a:latin typeface="Calibri"/>
+              </a:rPr>
+              <a:t>as</a:t>
+            </a:r>
+            <a:r>
+              <a:rPr lang="de-DE" sz="2400" b="0" strike="noStrike" spc="-1" dirty="0">
+                <a:solidFill>
+                  <a:srgbClr val="000000"/>
+                </a:solidFill>
+                <a:latin typeface="Calibri"/>
+              </a:rPr>
+              <a:t> a </a:t>
+            </a:r>
+            <a:r>
+              <a:rPr lang="de-DE" sz="2400" b="0" strike="noStrike" spc="-1" dirty="0" err="1">
+                <a:solidFill>
+                  <a:srgbClr val="000000"/>
+                </a:solidFill>
+                <a:latin typeface="Calibri"/>
+              </a:rPr>
+              <a:t>free</a:t>
+            </a:r>
+            <a:r>
+              <a:rPr lang="de-DE" sz="2400" b="0" strike="noStrike" spc="-1" dirty="0">
+                <a:solidFill>
+                  <a:srgbClr val="000000"/>
+                </a:solidFill>
+                <a:latin typeface="Calibri"/>
+              </a:rPr>
+              <a:t>, open source </a:t>
+            </a:r>
+            <a:r>
+              <a:rPr lang="de-DE" sz="2400" b="0" strike="noStrike" spc="-1" dirty="0" err="1">
+                <a:solidFill>
+                  <a:srgbClr val="000000"/>
+                </a:solidFill>
+                <a:latin typeface="Calibri"/>
+              </a:rPr>
+              <a:t>software</a:t>
+            </a:r>
+            <a:r>
+              <a:rPr lang="de-DE" sz="2400" b="0" strike="noStrike" spc="-1" dirty="0">
+                <a:solidFill>
+                  <a:srgbClr val="000000"/>
+                </a:solidFill>
+                <a:latin typeface="Calibri"/>
+              </a:rPr>
+              <a:t> on 5th of March 2019</a:t>
             </a:r>
           </a:p>
           <a:p>
@@ -9631,14 +9694,56 @@
               <a:buChar char="–"/>
             </a:pPr>
             <a:r>
-              <a:rPr lang="de-DE" sz="2000" b="0" strike="noStrike" spc="-1">
-                <a:solidFill>
-                  <a:srgbClr val="000000"/>
-                </a:solidFill>
-                <a:latin typeface="Calibri"/>
-              </a:rPr>
-              <a:t>Improve cybersecurity tools</a:t>
-            </a:r>
+              <a:rPr lang="de-DE" sz="2000" b="0" strike="noStrike" spc="-1" dirty="0" err="1">
+                <a:solidFill>
+                  <a:srgbClr val="000000"/>
+                </a:solidFill>
+                <a:latin typeface="Calibri"/>
+              </a:rPr>
+              <a:t>Improve</a:t>
+            </a:r>
+            <a:r>
+              <a:rPr lang="de-DE" sz="2000" b="0" strike="noStrike" spc="-1" dirty="0">
+                <a:solidFill>
+                  <a:srgbClr val="000000"/>
+                </a:solidFill>
+                <a:latin typeface="Calibri"/>
+              </a:rPr>
+              <a:t> </a:t>
+            </a:r>
+            <a:r>
+              <a:rPr lang="de-DE" sz="2000" b="0" strike="noStrike" spc="-1" dirty="0" err="1">
+                <a:solidFill>
+                  <a:srgbClr val="000000"/>
+                </a:solidFill>
+                <a:latin typeface="Calibri"/>
+              </a:rPr>
+              <a:t>cybersecurity</a:t>
+            </a:r>
+            <a:r>
+              <a:rPr lang="de-DE" sz="2000" b="0" strike="noStrike" spc="-1" dirty="0">
+                <a:solidFill>
+                  <a:srgbClr val="000000"/>
+                </a:solidFill>
+                <a:latin typeface="Calibri"/>
+              </a:rPr>
+              <a:t> </a:t>
+            </a:r>
+            <a:r>
+              <a:rPr lang="de-DE" sz="2000" b="0" strike="noStrike" spc="-1" dirty="0" err="1">
+                <a:solidFill>
+                  <a:srgbClr val="000000"/>
+                </a:solidFill>
+                <a:latin typeface="Calibri"/>
+              </a:rPr>
+              <a:t>tools</a:t>
+            </a:r>
+            <a:endParaRPr lang="de-DE" sz="2000" b="0" strike="noStrike" spc="-1" dirty="0">
+              <a:solidFill>
+                <a:srgbClr val="000000"/>
+              </a:solidFill>
+              <a:latin typeface="Calibri"/>
+            </a:endParaRPr>
           </a:p>
           <a:p>
             <a:pPr marL="548640" lvl="1" indent="-228240">
@@ -9655,14 +9760,38 @@
               <a:buChar char="–"/>
             </a:pPr>
             <a:r>
-              <a:rPr lang="de-DE" sz="2000" b="0" strike="noStrike" spc="-1">
-                <a:solidFill>
-                  <a:srgbClr val="000000"/>
-                </a:solidFill>
-                <a:latin typeface="Calibri"/>
-              </a:rPr>
-              <a:t>Build a community</a:t>
-            </a:r>
+              <a:rPr lang="de-DE" sz="2000" b="0" strike="noStrike" spc="-1" dirty="0" err="1">
+                <a:solidFill>
+                  <a:srgbClr val="000000"/>
+                </a:solidFill>
+                <a:latin typeface="Calibri"/>
+              </a:rPr>
+              <a:t>Build</a:t>
+            </a:r>
+            <a:r>
+              <a:rPr lang="de-DE" sz="2000" b="0" strike="noStrike" spc="-1" dirty="0">
+                <a:solidFill>
+                  <a:srgbClr val="000000"/>
+                </a:solidFill>
+                <a:latin typeface="Calibri"/>
+              </a:rPr>
+              <a:t> a </a:t>
+            </a:r>
+            <a:r>
+              <a:rPr lang="de-DE" sz="2000" b="0" strike="noStrike" spc="-1" dirty="0" err="1">
+                <a:solidFill>
+                  <a:srgbClr val="000000"/>
+                </a:solidFill>
+                <a:latin typeface="Calibri"/>
+              </a:rPr>
+              <a:t>community</a:t>
+            </a:r>
+            <a:endParaRPr lang="de-DE" sz="2000" b="0" strike="noStrike" spc="-1" dirty="0">
+              <a:solidFill>
+                <a:srgbClr val="000000"/>
+              </a:solidFill>
+              <a:latin typeface="Calibri"/>
+            </a:endParaRPr>
           </a:p>
           <a:p>
             <a:pPr marL="274320" indent="-273960">
@@ -9680,13 +9809,22 @@
               <a:buChar char=""/>
             </a:pPr>
             <a:r>
-              <a:rPr lang="de-DE" sz="2400" b="0" strike="noStrike" spc="-1">
-                <a:solidFill>
-                  <a:srgbClr val="000000"/>
-                </a:solidFill>
-                <a:latin typeface="Calibri"/>
-              </a:rPr>
-              <a:t>Build on Java</a:t>
+              <a:rPr lang="de-DE" sz="2400" b="0" strike="noStrike" spc="-1" dirty="0" err="1">
+                <a:solidFill>
+                  <a:srgbClr val="000000"/>
+                </a:solidFill>
+                <a:latin typeface="Calibri"/>
+              </a:rPr>
+              <a:t>Build</a:t>
+            </a:r>
+            <a:r>
+              <a:rPr lang="de-DE" sz="2400" b="0" strike="noStrike" spc="-1" dirty="0">
+                <a:solidFill>
+                  <a:srgbClr val="000000"/>
+                </a:solidFill>
+                <a:latin typeface="Calibri"/>
+              </a:rPr>
+              <a:t> on Java</a:t>
             </a:r>
           </a:p>
           <a:p>
@@ -9704,7 +9842,7 @@
               <a:buChar char="–"/>
             </a:pPr>
             <a:r>
-              <a:rPr lang="de-DE" sz="2000" b="0" strike="noStrike" spc="-1">
+              <a:rPr lang="de-DE" sz="2000" b="0" strike="noStrike" spc="-1" dirty="0">
                 <a:solidFill>
                   <a:srgbClr val="000000"/>
                 </a:solidFill>
@@ -9729,14 +9867,56 @@
               <a:buChar char=""/>
             </a:pPr>
             <a:r>
-              <a:rPr lang="de-DE" sz="2400" b="0" strike="noStrike" spc="-1">
-                <a:solidFill>
-                  <a:srgbClr val="000000"/>
-                </a:solidFill>
-                <a:latin typeface="Calibri"/>
-              </a:rPr>
-              <a:t>Active Github page</a:t>
-            </a:r>
+              <a:rPr lang="de-DE" sz="2400" b="0" strike="noStrike" spc="-1" dirty="0" err="1">
+                <a:solidFill>
+                  <a:srgbClr val="000000"/>
+                </a:solidFill>
+                <a:latin typeface="Calibri"/>
+              </a:rPr>
+              <a:t>Active</a:t>
+            </a:r>
+            <a:r>
+              <a:rPr lang="de-DE" sz="2400" b="0" strike="noStrike" spc="-1" dirty="0">
+                <a:solidFill>
+                  <a:srgbClr val="000000"/>
+                </a:solidFill>
+                <a:latin typeface="Calibri"/>
+              </a:rPr>
+              <a:t> </a:t>
+            </a:r>
+            <a:r>
+              <a:rPr lang="de-DE" sz="2400" b="0" strike="noStrike" spc="-1" dirty="0" err="1">
+                <a:solidFill>
+                  <a:srgbClr val="000000"/>
+                </a:solidFill>
+                <a:latin typeface="Calibri"/>
+              </a:rPr>
+              <a:t>Github</a:t>
+            </a:r>
+            <a:r>
+              <a:rPr lang="de-DE" sz="2400" b="0" strike="noStrike" spc="-1" dirty="0">
+                <a:solidFill>
+                  <a:srgbClr val="000000"/>
+                </a:solidFill>
+                <a:latin typeface="Calibri"/>
+              </a:rPr>
+              <a:t> </a:t>
+            </a:r>
+            <a:r>
+              <a:rPr lang="de-DE" sz="2400" b="0" strike="noStrike" spc="-1" dirty="0" err="1">
+                <a:solidFill>
+                  <a:srgbClr val="000000"/>
+                </a:solidFill>
+                <a:latin typeface="Calibri"/>
+              </a:rPr>
+              <a:t>page</a:t>
+            </a:r>
+            <a:endParaRPr lang="de-DE" sz="2400" b="0" strike="noStrike" spc="-1" dirty="0">
+              <a:solidFill>
+                <a:srgbClr val="000000"/>
+              </a:solidFill>
+              <a:latin typeface="Calibri"/>
+            </a:endParaRPr>
           </a:p>
           <a:p>
             <a:pPr marL="274320" indent="-273960">
@@ -9754,14 +9934,38 @@
               <a:buChar char=""/>
             </a:pPr>
             <a:r>
-              <a:rPr lang="de-DE" sz="2400" b="0" strike="noStrike" spc="-1">
-                <a:solidFill>
-                  <a:srgbClr val="000000"/>
-                </a:solidFill>
-                <a:latin typeface="Calibri"/>
-              </a:rPr>
-              <a:t>Other tools: IDA, Radare, Binary Ninja</a:t>
-            </a:r>
+              <a:rPr lang="de-DE" sz="2400" b="0" strike="noStrike" spc="-1" dirty="0">
+                <a:solidFill>
+                  <a:srgbClr val="000000"/>
+                </a:solidFill>
+                <a:latin typeface="Calibri"/>
+              </a:rPr>
+              <a:t>Other </a:t>
+            </a:r>
+            <a:r>
+              <a:rPr lang="de-DE" sz="2400" b="0" strike="noStrike" spc="-1" dirty="0" err="1">
+                <a:solidFill>
+                  <a:srgbClr val="000000"/>
+                </a:solidFill>
+                <a:latin typeface="Calibri"/>
+              </a:rPr>
+              <a:t>tools</a:t>
+            </a:r>
+            <a:r>
+              <a:rPr lang="de-DE" sz="2400" b="0" strike="noStrike" spc="-1" dirty="0">
+                <a:solidFill>
+                  <a:srgbClr val="000000"/>
+                </a:solidFill>
+                <a:latin typeface="Calibri"/>
+              </a:rPr>
+              <a:t>: IDA, Radare, Binary Ninja</a:t>
+            </a:r>
+            <a:endParaRPr lang="de-DE" b="0" strike="noStrike" spc="-1" dirty="0">
+              <a:solidFill>
+                <a:srgbClr val="000000"/>
+              </a:solidFill>
+              <a:latin typeface="Calibri"/>
+            </a:endParaRPr>
           </a:p>
           <a:p>
             <a:pPr>
@@ -9772,12 +9976,61 @@
                 <a:spcPts val="1800"/>
               </a:spcBef>
             </a:pPr>
-            <a:endParaRPr lang="de-DE" sz="2400" b="0" strike="noStrike" spc="-1">
+            <a:endParaRPr lang="de-DE" sz="1400" b="0" strike="noStrike" spc="-1" dirty="0">
               <a:solidFill>
                 <a:srgbClr val="000000"/>
               </a:solidFill>
               <a:latin typeface="Calibri"/>
             </a:endParaRPr>
+          </a:p>
+        </p:txBody>
+      </p:sp>
+      <p:sp>
+        <p:nvSpPr>
+          <p:cNvPr id="2" name="Textfeld 1">
+            <a:extLst>
+              <a:ext uri="{FF2B5EF4-FFF2-40B4-BE49-F238E27FC236}">
+                <a16:creationId xmlns:a16="http://schemas.microsoft.com/office/drawing/2014/main" id="{AC968BFE-6998-475C-A467-A6D9F35E5D6A}"/>
+              </a:ext>
+            </a:extLst>
+          </p:cNvPr>
+          <p:cNvSpPr txBox="1"/>
+          <p:nvPr/>
+        </p:nvSpPr>
+        <p:spPr>
+          <a:xfrm>
+            <a:off x="1522800" y="5602320"/>
+            <a:ext cx="6287678" cy="307777"/>
+          </a:xfrm>
+          <a:prstGeom prst="rect">
+            <a:avLst/>
+          </a:prstGeom>
+          <a:noFill/>
+        </p:spPr>
+        <p:txBody>
+          <a:bodyPr wrap="square" rtlCol="0">
+            <a:spAutoFit/>
+          </a:bodyPr>
+          <a:lstStyle/>
+          <a:p>
+            <a:r>
+              <a:rPr lang="de-DE" sz="1400" dirty="0">
+                <a:latin typeface="Calibri" panose="020F0502020204030204" pitchFamily="34" charset="0"/>
+                <a:cs typeface="Calibri" panose="020F0502020204030204" pitchFamily="34" charset="0"/>
+              </a:rPr>
+              <a:t>Source</a:t>
+            </a:r>
+            <a:r>
+              <a:rPr lang="de-DE" sz="1400" dirty="0"/>
+              <a:t>: </a:t>
+            </a:r>
+            <a:r>
+              <a:rPr lang="de-DE" sz="1400" dirty="0">
+                <a:hlinkClick r:id="rId3"/>
+              </a:rPr>
+              <a:t>https://ghidra-sre.org/</a:t>
+            </a:r>
+            <a:endParaRPr lang="de-DE" sz="1400" u="sng" dirty="0"/>
           </a:p>
         </p:txBody>
       </p:sp>
@@ -9792,7 +10045,7 @@
         <p:fade/>
       </p:transition>
     </mc:Choice>
-    <mc:Fallback xmlns="" xmlns:p15="http://schemas.microsoft.com/office/powerpoint/2012/main">
+    <mc:Fallback xmlns:p15="http://schemas.microsoft.com/office/powerpoint/2012/main" xmlns="">
       <p:transition spd="med">
         <p:fade/>
       </p:transition>
@@ -10241,7 +10494,7 @@
         <p:fade/>
       </p:transition>
     </mc:Choice>
-    <mc:Fallback xmlns="" xmlns:p15="http://schemas.microsoft.com/office/powerpoint/2012/main">
+    <mc:Fallback xmlns:p15="http://schemas.microsoft.com/office/powerpoint/2012/main" xmlns="">
       <p:transition spd="med">
         <p:fade/>
       </p:transition>
@@ -11414,7 +11667,7 @@
             </a:r>
           </a:p>
           <a:p>
-            <a:pPr marL="274320" indent="-273960">
+            <a:pPr marL="360">
               <a:lnSpc>
                 <a:spcPct val="90000"/>
               </a:lnSpc>
@@ -11425,10 +11678,38 @@
                 <a:srgbClr val="000000"/>
               </a:buClr>
               <a:buSzPct val="80000"/>
-              <a:buFont typeface="Wingdings" charset="2"/>
-              <a:buChar char=""/>
             </a:pPr>
-            <a:endParaRPr lang="de-DE" sz="2400" b="0" strike="noStrike" spc="-1" dirty="0">
+            <a:r>
+              <a:rPr lang="de-DE" sz="1400" b="0" strike="noStrike" spc="-1" dirty="0">
+                <a:solidFill>
+                  <a:srgbClr val="000000"/>
+                </a:solidFill>
+                <a:latin typeface="Calibri"/>
+              </a:rPr>
+              <a:t>Source: </a:t>
+            </a:r>
+            <a:r>
+              <a:rPr lang="de-DE" sz="1400" dirty="0">
+                <a:hlinkClick r:id="rId3"/>
+              </a:rPr>
+              <a:t>https://blogs.blackberry.com/en/2019/07/an-introduction-to-code-analysis-with-ghidra</a:t>
+            </a:r>
+            <a:endParaRPr lang="de-DE" sz="1400" dirty="0"/>
+          </a:p>
+          <a:p>
+            <a:pPr marL="360">
+              <a:lnSpc>
+                <a:spcPct val="90000"/>
+              </a:lnSpc>
+              <a:spcBef>
+                <a:spcPts val="1800"/>
+              </a:spcBef>
+              <a:buClr>
+                <a:srgbClr val="000000"/>
+              </a:buClr>
+              <a:buSzPct val="80000"/>
+            </a:pPr>
+            <a:endParaRPr lang="de-DE" sz="1400" b="0" strike="noStrike" spc="-1" dirty="0">
               <a:solidFill>
                 <a:srgbClr val="000000"/>
               </a:solidFill>
@@ -11448,7 +11729,7 @@
         <p:fade/>
       </p:transition>
     </mc:Choice>
-    <mc:Fallback xmlns="" xmlns:p15="http://schemas.microsoft.com/office/powerpoint/2012/main">
+    <mc:Fallback xmlns:p15="http://schemas.microsoft.com/office/powerpoint/2012/main" xmlns="">
       <p:transition spd="med">
         <p:fade/>
       </p:transition>
@@ -11476,38 +11757,10 @@
       </p:grpSpPr>
       <p:sp>
         <p:nvSpPr>
-          <p:cNvPr id="2" name="Titel 1">
+          <p:cNvPr id="2" name="Untertitel 1">
             <a:extLst>
               <a:ext uri="{FF2B5EF4-FFF2-40B4-BE49-F238E27FC236}">
-                <a16:creationId xmlns:a16="http://schemas.microsoft.com/office/drawing/2014/main" id="{E3E75EC7-9ADC-40A6-AB37-8D887140C5E3}"/>
-              </a:ext>
-            </a:extLst>
-          </p:cNvPr>
-          <p:cNvSpPr>
-            <a:spLocks noGrp="1"/>
-          </p:cNvSpPr>
-          <p:nvPr>
-            <p:ph type="title"/>
-          </p:nvPr>
-        </p:nvSpPr>
-        <p:spPr/>
-        <p:txBody>
-          <a:bodyPr/>
-          <a:lstStyle/>
-          <a:p>
-            <a:r>
-              <a:rPr lang="de-DE" dirty="0"/>
-              <a:t>Sources</a:t>
-            </a:r>
-          </a:p>
-        </p:txBody>
-      </p:sp>
-      <p:sp>
-        <p:nvSpPr>
-          <p:cNvPr id="3" name="Untertitel 2">
-            <a:extLst>
-              <a:ext uri="{FF2B5EF4-FFF2-40B4-BE49-F238E27FC236}">
-                <a16:creationId xmlns:a16="http://schemas.microsoft.com/office/drawing/2014/main" id="{22FB4F2F-D584-4086-952E-C5713D4E4C21}"/>
+                <a16:creationId xmlns:a16="http://schemas.microsoft.com/office/drawing/2014/main" id="{4D2974C7-DE23-43DF-817A-B0A64AAB2B30}"/>
               </a:ext>
             </a:extLst>
           </p:cNvPr>
@@ -11520,78 +11773,87 @@
         </p:nvSpPr>
         <p:spPr/>
         <p:txBody>
-          <a:bodyPr/>
-          <a:lstStyle/>
-          <a:p>
-            <a:pPr marL="0" indent="0">
-              <a:buNone/>
-            </a:pPr>
-            <a:r>
-              <a:rPr lang="de-DE" sz="1600" dirty="0"/>
-              <a:t> </a:t>
-            </a:r>
-            <a:r>
-              <a:rPr lang="de-DE" sz="1600" dirty="0">
-                <a:hlinkClick r:id="rId2"/>
-              </a:rPr>
-              <a:t>https://cybersecurity.osu.edu/cybersecurity-you/avoid-threats/what-zero-day-exploit</a:t>
-            </a:r>
-            <a:endParaRPr lang="de-DE" sz="1600" dirty="0"/>
-          </a:p>
-          <a:p>
-            <a:pPr marL="0" indent="0">
-              <a:buNone/>
-            </a:pPr>
-            <a:r>
-              <a:rPr lang="de-DE" sz="1600" dirty="0">
-                <a:hlinkClick r:id="rId3"/>
-              </a:rPr>
-              <a:t>https://blogs.blackberry.com/en/2019/07/an-introduction-to-code-analysis-with-ghidra</a:t>
-            </a:r>
-            <a:endParaRPr lang="de-DE" sz="1600" dirty="0"/>
-          </a:p>
-          <a:p>
-            <a:pPr marL="0" indent="0">
-              <a:buNone/>
-            </a:pPr>
-            <a:r>
-              <a:rPr lang="de-DE" sz="1600" dirty="0">
-                <a:hlinkClick r:id="rId4"/>
-              </a:rPr>
-              <a:t>https://medium.com/@yogeshojha/reverse-engineering-wannacry-ransomware-using-ghidra-finding-the-killswitch-a212807e9354</a:t>
-            </a:r>
-            <a:endParaRPr lang="de-DE" sz="1600" dirty="0"/>
-          </a:p>
-          <a:p>
-            <a:pPr marL="0" indent="0">
-              <a:buNone/>
-            </a:pPr>
-            <a:r>
-              <a:rPr lang="de-DE" sz="1600">
-                <a:hlinkClick r:id="rId5"/>
-              </a:rPr>
-              <a:t>https://www.howtogeek.com/410634/what-is-rat-malware-and-why-is-it-so-dangerous/</a:t>
-            </a:r>
-            <a:endParaRPr lang="de-DE" sz="1600"/>
-          </a:p>
-          <a:p>
-            <a:pPr marL="0" indent="0">
-              <a:buNone/>
-            </a:pPr>
-            <a:endParaRPr lang="de-DE" sz="1600" dirty="0"/>
-          </a:p>
+          <a:bodyPr anchor="t" anchorCtr="0"/>
+          <a:lstStyle/>
           <a:p>
             <a:pPr marL="0" indent="0">
               <a:buNone/>
             </a:pPr>
             <a:endParaRPr lang="de-DE" dirty="0"/>
           </a:p>
+          <a:p>
+            <a:pPr marL="0" indent="0">
+              <a:buNone/>
+            </a:pPr>
+            <a:r>
+              <a:rPr lang="de-DE" u="sng" dirty="0"/>
+              <a:t>Additional Sources:</a:t>
+            </a:r>
+          </a:p>
+          <a:p>
+            <a:pPr marL="0" indent="0">
+              <a:buNone/>
+            </a:pPr>
+            <a:r>
+              <a:rPr lang="de-DE" sz="2000" dirty="0"/>
+              <a:t>0Day Exploit: </a:t>
+            </a:r>
+            <a:r>
+              <a:rPr lang="de-DE" sz="2000" dirty="0">
+                <a:hlinkClick r:id="rId2"/>
+              </a:rPr>
+              <a:t>https://cybersecurity.osu.edu/cybersecurity-you/avoid-threats/what-zero-day-exploit</a:t>
+            </a:r>
+            <a:endParaRPr lang="de-DE" sz="2000" dirty="0"/>
+          </a:p>
+          <a:p>
+            <a:pPr marL="0" indent="0">
+              <a:buNone/>
+            </a:pPr>
+            <a:r>
+              <a:rPr lang="de-DE" sz="2000" dirty="0" err="1"/>
+              <a:t>WannaCry</a:t>
+            </a:r>
+            <a:r>
+              <a:rPr lang="de-DE" sz="2000" dirty="0"/>
+              <a:t>: </a:t>
+            </a:r>
+            <a:r>
+              <a:rPr lang="de-DE" sz="2000" dirty="0">
+                <a:hlinkClick r:id="rId3"/>
+              </a:rPr>
+              <a:t>https://medium.com/@yogeshojha/reverse-engineering-wannacry-ransomware-using-ghidra-finding-the-killswitch-a212807e9354</a:t>
+            </a:r>
+            <a:endParaRPr lang="de-DE" sz="2000" dirty="0"/>
+          </a:p>
+          <a:p>
+            <a:pPr marL="0" indent="0">
+              <a:buNone/>
+            </a:pPr>
+            <a:r>
+              <a:rPr lang="de-DE" sz="2000" dirty="0"/>
+              <a:t>RAT – File: </a:t>
+            </a:r>
+            <a:r>
+              <a:rPr lang="de-DE" sz="2000" dirty="0">
+                <a:hlinkClick r:id="rId4"/>
+              </a:rPr>
+              <a:t>https://www.howtogeek.com/410634/what-is-rat-malware-and-why-is-it-so-dangerous/</a:t>
+            </a:r>
+            <a:endParaRPr lang="de-DE" sz="2000" dirty="0"/>
+          </a:p>
+          <a:p>
+            <a:pPr marL="0" indent="0">
+              <a:buNone/>
+            </a:pPr>
+            <a:endParaRPr lang="de-DE" sz="2000" dirty="0"/>
+          </a:p>
         </p:txBody>
       </p:sp>
     </p:spTree>
     <p:extLst>
       <p:ext uri="{BB962C8B-B14F-4D97-AF65-F5344CB8AC3E}">
-        <p14:creationId xmlns:p14="http://schemas.microsoft.com/office/powerpoint/2010/main" val="2851707373"/>
+        <p14:creationId xmlns:p14="http://schemas.microsoft.com/office/powerpoint/2010/main" val="470214542"/>
       </p:ext>
     </p:extLst>
   </p:cSld>
@@ -11932,7 +12194,7 @@
         <p:fade/>
       </p:transition>
     </mc:Choice>
-    <mc:Fallback xmlns="" xmlns:p15="http://schemas.microsoft.com/office/powerpoint/2012/main">
+    <mc:Fallback xmlns:p15="http://schemas.microsoft.com/office/powerpoint/2012/main" xmlns="">
       <p:transition spd="med">
         <p:fade/>
       </p:transition>
@@ -12343,7 +12605,7 @@
         <p:fade/>
       </p:transition>
     </mc:Choice>
-    <mc:Fallback xmlns="" xmlns:p15="http://schemas.microsoft.com/office/powerpoint/2012/main">
+    <mc:Fallback xmlns:p15="http://schemas.microsoft.com/office/powerpoint/2012/main" xmlns="">
       <p:transition spd="med">
         <p:fade/>
       </p:transition>
@@ -12657,7 +12919,7 @@
         <p:fade/>
       </p:transition>
     </mc:Choice>
-    <mc:Fallback xmlns="" xmlns:p15="http://schemas.microsoft.com/office/powerpoint/2012/main">
+    <mc:Fallback xmlns:p15="http://schemas.microsoft.com/office/powerpoint/2012/main" xmlns="">
       <p:transition spd="med">
         <p:fade/>
       </p:transition>
@@ -12923,7 +13185,7 @@
         <p:fade/>
       </p:transition>
     </mc:Choice>
-    <mc:Fallback xmlns="" xmlns:p15="http://schemas.microsoft.com/office/powerpoint/2012/main">
+    <mc:Fallback xmlns:p15="http://schemas.microsoft.com/office/powerpoint/2012/main" xmlns="">
       <p:transition spd="med">
         <p:fade/>
       </p:transition>
@@ -13464,7 +13726,7 @@
         <p:fade/>
       </p:transition>
     </mc:Choice>
-    <mc:Fallback xmlns="" xmlns:p15="http://schemas.microsoft.com/office/powerpoint/2012/main">
+    <mc:Fallback xmlns:p15="http://schemas.microsoft.com/office/powerpoint/2012/main" xmlns="">
       <p:transition spd="med">
         <p:fade/>
       </p:transition>
@@ -14583,7 +14845,7 @@
         <p:fade/>
       </p:transition>
     </mc:Choice>
-    <mc:Fallback xmlns="" xmlns:p15="http://schemas.microsoft.com/office/powerpoint/2012/main">
+    <mc:Fallback xmlns:p15="http://schemas.microsoft.com/office/powerpoint/2012/main" xmlns="">
       <p:transition spd="med">
         <p:fade/>
       </p:transition>
@@ -14780,7 +15042,7 @@
         <p:fade/>
       </p:transition>
     </mc:Choice>
-    <mc:Fallback xmlns="" xmlns:p15="http://schemas.microsoft.com/office/powerpoint/2012/main">
+    <mc:Fallback xmlns:p15="http://schemas.microsoft.com/office/powerpoint/2012/main" xmlns="">
       <p:transition spd="med">
         <p:fade/>
       </p:transition>
@@ -14999,7 +15261,7 @@
         <p:fade/>
       </p:transition>
     </mc:Choice>
-    <mc:Fallback xmlns="" xmlns:p15="http://schemas.microsoft.com/office/powerpoint/2012/main">
+    <mc:Fallback xmlns:p15="http://schemas.microsoft.com/office/powerpoint/2012/main" xmlns="">
       <p:transition spd="med">
         <p:fade/>
       </p:transition>
@@ -15506,7 +15768,7 @@
         <p:fade/>
       </p:transition>
     </mc:Choice>
-    <mc:Fallback xmlns="" xmlns:p15="http://schemas.microsoft.com/office/powerpoint/2012/main">
+    <mc:Fallback xmlns:p15="http://schemas.microsoft.com/office/powerpoint/2012/main" xmlns="">
       <p:transition spd="med">
         <p:fade/>
       </p:transition>
@@ -15782,7 +16044,7 @@
         <p:fade/>
       </p:transition>
     </mc:Choice>
-    <mc:Fallback xmlns="" xmlns:p15="http://schemas.microsoft.com/office/powerpoint/2012/main">
+    <mc:Fallback xmlns:p15="http://schemas.microsoft.com/office/powerpoint/2012/main" xmlns="">
       <p:transition spd="med">
         <p:fade/>
       </p:transition>

</xml_diff>

<commit_message>
two more crackmes, and a change to the presentation
</commit_message>
<xml_diff>
--- a/Reverse Engineering.pptx
+++ b/Reverse Engineering.pptx
@@ -127,6 +127,11 @@
       </a:defRPr>
     </a:lvl9pPr>
   </p:defaultTextStyle>
+  <p:extLst>
+    <p:ext uri="{EFAFB233-063F-42B5-8137-9DF3F51BA10A}">
+      <p15:sldGuideLst xmlns:p15="http://schemas.microsoft.com/office/powerpoint/2012/main"/>
+    </p:ext>
+  </p:extLst>
 </p:presentation>
 </file>
 
@@ -14537,7 +14542,7 @@
         <p:fade/>
       </p:transition>
     </mc:Choice>
-    <mc:Fallback xmlns:p15="http://schemas.microsoft.com/office/powerpoint/2012/main" xmlns="">
+    <mc:Fallback xmlns="" xmlns:p15="http://schemas.microsoft.com/office/powerpoint/2012/main">
       <p:transition spd="med">
         <p:fade/>
       </p:transition>
@@ -14876,7 +14881,7 @@
         <p:fade/>
       </p:transition>
     </mc:Choice>
-    <mc:Fallback xmlns:p15="http://schemas.microsoft.com/office/powerpoint/2012/main" xmlns="">
+    <mc:Fallback xmlns="" xmlns:p15="http://schemas.microsoft.com/office/powerpoint/2012/main">
       <p:transition spd="med">
         <p:fade/>
       </p:transition>
@@ -15130,7 +15135,7 @@
         <p:fade/>
       </p:transition>
     </mc:Choice>
-    <mc:Fallback xmlns:p15="http://schemas.microsoft.com/office/powerpoint/2012/main" xmlns="">
+    <mc:Fallback xmlns="" xmlns:p15="http://schemas.microsoft.com/office/powerpoint/2012/main">
       <p:transition spd="med">
         <p:fade/>
       </p:transition>
@@ -15790,7 +15795,7 @@
         <p:fade/>
       </p:transition>
     </mc:Choice>
-    <mc:Fallback xmlns:p15="http://schemas.microsoft.com/office/powerpoint/2012/main" xmlns="">
+    <mc:Fallback xmlns="" xmlns:p15="http://schemas.microsoft.com/office/powerpoint/2012/main">
       <p:transition spd="med">
         <p:fade/>
       </p:transition>
@@ -16272,18 +16277,26 @@
               <a:buChar char="–"/>
             </a:pPr>
             <a:r>
-              <a:rPr lang="de-DE" sz="2000" b="0" strike="noStrike" spc="-1" dirty="0">
-                <a:solidFill>
-                  <a:srgbClr val="000000"/>
-                </a:solidFill>
-                <a:latin typeface="Calibri"/>
-                <a:ea typeface="DejaVu Sans"/>
-              </a:rPr>
-              <a:t>Assembly code</a:t>
-            </a:r>
-            <a:endParaRPr lang="en-GB" sz="2000" b="0" strike="noStrike" spc="-1" dirty="0">
-              <a:latin typeface="Arial"/>
-            </a:endParaRPr>
+              <a:rPr lang="en-GB" sz="2000" b="0" strike="noStrike" spc="-1" dirty="0">
+                <a:latin typeface="Calibri" panose="020F0502020204030204" pitchFamily="34" charset="0"/>
+                <a:cs typeface="Calibri" panose="020F0502020204030204" pitchFamily="34" charset="0"/>
+              </a:rPr>
+              <a:t>Java </a:t>
+            </a:r>
+            <a:r>
+              <a:rPr lang="en-GB" sz="2000" b="0" strike="noStrike" spc="-1" dirty="0" err="1">
+                <a:latin typeface="Calibri" panose="020F0502020204030204" pitchFamily="34" charset="0"/>
+                <a:cs typeface="Calibri" panose="020F0502020204030204" pitchFamily="34" charset="0"/>
+              </a:rPr>
+              <a:t>ByteCode</a:t>
+            </a:r>
+            <a:r>
+              <a:rPr lang="en-GB" sz="2000" b="0" strike="noStrike" spc="-1" dirty="0">
+                <a:latin typeface="Calibri" panose="020F0502020204030204" pitchFamily="34" charset="0"/>
+                <a:cs typeface="Calibri" panose="020F0502020204030204" pitchFamily="34" charset="0"/>
+              </a:rPr>
+              <a:t> Instructions</a:t>
+            </a:r>
           </a:p>
           <a:p>
             <a:pPr marL="548640" lvl="1" indent="-228240">
@@ -16451,7 +16464,7 @@
         <p:fade/>
       </p:transition>
     </mc:Choice>
-    <mc:Fallback xmlns:p15="http://schemas.microsoft.com/office/powerpoint/2012/main" xmlns="">
+    <mc:Fallback xmlns="" xmlns:p15="http://schemas.microsoft.com/office/powerpoint/2012/main">
       <p:transition spd="med">
         <p:fade/>
       </p:transition>
@@ -16771,7 +16784,7 @@
         <p:fade/>
       </p:transition>
     </mc:Choice>
-    <mc:Fallback xmlns:p15="http://schemas.microsoft.com/office/powerpoint/2012/main" xmlns="">
+    <mc:Fallback xmlns="" xmlns:p15="http://schemas.microsoft.com/office/powerpoint/2012/main">
       <p:transition spd="med">
         <p:fade/>
       </p:transition>
@@ -16884,29 +16897,83 @@
               </a:tabLst>
             </a:pPr>
             <a:r>
-              <a:rPr lang="de-DE" sz="2000" b="0" strike="noStrike" spc="-1" dirty="0">
+              <a:rPr lang="de-DE" sz="2000" spc="-1" dirty="0">
                 <a:solidFill>
                   <a:srgbClr val="000000"/>
                 </a:solidFill>
                 <a:latin typeface="Arial"/>
                 <a:ea typeface="DejaVu Sans"/>
               </a:rPr>
-              <a:t>0Day Exploit: </a:t>
-            </a:r>
-            <a:r>
-              <a:rPr lang="de-DE" sz="2000" b="0" u="sng" strike="noStrike" spc="-1" dirty="0">
-                <a:solidFill>
-                  <a:srgbClr val="F7B615"/>
-                </a:solidFill>
-                <a:uFillTx/>
+              <a:t>Java </a:t>
+            </a:r>
+            <a:r>
+              <a:rPr lang="de-DE" sz="2000" spc="-1" dirty="0" err="1">
+                <a:solidFill>
+                  <a:srgbClr val="000000"/>
+                </a:solidFill>
+                <a:latin typeface="Arial"/>
+                <a:ea typeface="DejaVu Sans"/>
+              </a:rPr>
+              <a:t>ByteCode</a:t>
+            </a:r>
+            <a:r>
+              <a:rPr lang="de-DE" sz="2000" spc="-1" dirty="0">
+                <a:solidFill>
+                  <a:srgbClr val="000000"/>
+                </a:solidFill>
+                <a:latin typeface="Arial"/>
+                <a:ea typeface="DejaVu Sans"/>
+              </a:rPr>
+              <a:t> </a:t>
+            </a:r>
+            <a:r>
+              <a:rPr lang="de-DE" sz="2000" spc="-1" dirty="0" err="1">
+                <a:solidFill>
+                  <a:srgbClr val="000000"/>
+                </a:solidFill>
+                <a:latin typeface="Arial"/>
+                <a:ea typeface="DejaVu Sans"/>
+              </a:rPr>
+              <a:t>Instructions</a:t>
+            </a:r>
+            <a:r>
+              <a:rPr lang="de-DE" sz="2000" spc="-1" dirty="0">
+                <a:solidFill>
+                  <a:srgbClr val="000000"/>
+                </a:solidFill>
+                <a:latin typeface="Arial"/>
+                <a:ea typeface="DejaVu Sans"/>
+              </a:rPr>
+              <a:t>: </a:t>
+            </a:r>
+            <a:r>
+              <a:rPr lang="de-DE" sz="2000" spc="-1" dirty="0">
+                <a:solidFill>
+                  <a:srgbClr val="000000"/>
+                </a:solidFill>
                 <a:latin typeface="Arial"/>
                 <a:ea typeface="DejaVu Sans"/>
                 <a:hlinkClick r:id="rId2"/>
               </a:rPr>
-              <a:t>https://cybersecurity.osu.edu/cybersecurity-you/avoid-threats/what-zero-day-exploit</a:t>
-            </a:r>
-            <a:endParaRPr lang="en-GB" sz="2000" b="0" strike="noStrike" spc="-1" dirty="0">
-              <a:latin typeface="Arial"/>
+              <a:t>https://en.wikipedia.org/wiki/List_of_Java_bytecode</a:t>
+            </a:r>
+            <a:r>
+              <a:rPr lang="de-DE" sz="2000" spc="-1">
+                <a:solidFill>
+                  <a:srgbClr val="000000"/>
+                </a:solidFill>
+                <a:latin typeface="Arial"/>
+                <a:ea typeface="DejaVu Sans"/>
+                <a:hlinkClick r:id="rId2"/>
+              </a:rPr>
+              <a:t>_instructions</a:t>
+            </a:r>
+            <a:endParaRPr lang="de-DE" sz="2000" b="0" strike="noStrike" spc="-1" dirty="0">
+              <a:solidFill>
+                <a:srgbClr val="000000"/>
+              </a:solidFill>
+              <a:latin typeface="Arial"/>
+              <a:ea typeface="DejaVu Sans"/>
             </a:endParaRPr>
           </a:p>
           <a:p>
@@ -16924,24 +16991,14 @@
               </a:tabLst>
             </a:pPr>
             <a:r>
-              <a:rPr lang="de-DE" sz="2000" b="0" strike="noStrike" spc="-1" dirty="0" err="1">
+              <a:rPr lang="de-DE" sz="2000" b="0" strike="noStrike" spc="-1" dirty="0">
                 <a:solidFill>
                   <a:srgbClr val="000000"/>
                 </a:solidFill>
                 <a:latin typeface="Arial"/>
                 <a:ea typeface="DejaVu Sans"/>
               </a:rPr>
-              <a:t>WannaCry</a:t>
-            </a:r>
-            <a:r>
-              <a:rPr lang="de-DE" sz="2000" b="0" strike="noStrike" spc="-1" dirty="0">
-                <a:solidFill>
-                  <a:srgbClr val="000000"/>
-                </a:solidFill>
-                <a:latin typeface="Arial"/>
-                <a:ea typeface="DejaVu Sans"/>
-              </a:rPr>
-              <a:t>: </a:t>
+              <a:t>0Day Exploit: </a:t>
             </a:r>
             <a:r>
               <a:rPr lang="de-DE" sz="2000" b="0" u="sng" strike="noStrike" spc="-1" dirty="0">
@@ -16953,7 +17010,7 @@
                 <a:ea typeface="DejaVu Sans"/>
                 <a:hlinkClick r:id="rId3"/>
               </a:rPr>
-              <a:t>https://medium.com/@yogeshojha/reverse-engineering-wannacry-ransomware-using-ghidra-finding-the-killswitch-a212807e9354</a:t>
+              <a:t>https://cybersecurity.osu.edu/cybersecurity-you/avoid-threats/what-zero-day-exploit</a:t>
             </a:r>
             <a:endParaRPr lang="en-GB" sz="2000" b="0" strike="noStrike" spc="-1" dirty="0">
               <a:latin typeface="Arial"/>
@@ -16974,14 +17031,24 @@
               </a:tabLst>
             </a:pPr>
             <a:r>
-              <a:rPr lang="de-DE" sz="2000" b="0" strike="noStrike" spc="-1" dirty="0">
+              <a:rPr lang="de-DE" sz="2000" b="0" strike="noStrike" spc="-1" dirty="0" err="1">
                 <a:solidFill>
                   <a:srgbClr val="000000"/>
                 </a:solidFill>
                 <a:latin typeface="Arial"/>
                 <a:ea typeface="DejaVu Sans"/>
               </a:rPr>
-              <a:t>RAT – File: </a:t>
+              <a:t>WannaCry</a:t>
+            </a:r>
+            <a:r>
+              <a:rPr lang="de-DE" sz="2000" b="0" strike="noStrike" spc="-1" dirty="0">
+                <a:solidFill>
+                  <a:srgbClr val="000000"/>
+                </a:solidFill>
+                <a:latin typeface="Arial"/>
+                <a:ea typeface="DejaVu Sans"/>
+              </a:rPr>
+              <a:t>: </a:t>
             </a:r>
             <a:r>
               <a:rPr lang="de-DE" sz="2000" b="0" u="sng" strike="noStrike" spc="-1" dirty="0">
@@ -16993,7 +17060,7 @@
                 <a:ea typeface="DejaVu Sans"/>
                 <a:hlinkClick r:id="rId4"/>
               </a:rPr>
-              <a:t>https://www.howtogeek.com/410634/what-is-rat-malware-and-why-is-it-so-dangerous/</a:t>
+              <a:t>https://medium.com/@yogeshojha/reverse-engineering-wannacry-ransomware-using-ghidra-finding-the-killswitch-a212807e9354</a:t>
             </a:r>
             <a:endParaRPr lang="en-GB" sz="2000" b="0" strike="noStrike" spc="-1" dirty="0">
               <a:latin typeface="Arial"/>
@@ -17007,12 +17074,61 @@
               <a:spcBef>
                 <a:spcPts val="1001"/>
               </a:spcBef>
+              <a:buFont typeface="Wingdings" panose="05000000000000000000" pitchFamily="2" charset="2"/>
+              <a:buChar char="§"/>
               <a:tabLst>
                 <a:tab pos="0" algn="l"/>
               </a:tabLst>
             </a:pPr>
-            <a:endParaRPr lang="en-GB" sz="2000" b="0" strike="noStrike" spc="-1" dirty="0">
-              <a:latin typeface="Arial"/>
+            <a:r>
+              <a:rPr lang="de-DE" sz="2000" b="0" strike="noStrike" spc="-1" dirty="0">
+                <a:solidFill>
+                  <a:srgbClr val="000000"/>
+                </a:solidFill>
+                <a:latin typeface="Arial"/>
+                <a:ea typeface="DejaVu Sans"/>
+              </a:rPr>
+              <a:t>RAT – File: </a:t>
+            </a:r>
+            <a:r>
+              <a:rPr lang="de-DE" sz="2000" u="sng" spc="-1" dirty="0">
+                <a:solidFill>
+                  <a:srgbClr val="F7B615"/>
+                </a:solidFill>
+                <a:latin typeface="Arial"/>
+                <a:ea typeface="DejaVu Sans"/>
+                <a:hlinkClick r:id="rId5"/>
+              </a:rPr>
+              <a:t>https://www.howtogeek.com/410634/what-is-rat-malware-and-why-is-it-so-dangerous/</a:t>
+            </a:r>
+            <a:endParaRPr lang="de-DE" sz="2000" u="sng" spc="-1" dirty="0">
+              <a:solidFill>
+                <a:srgbClr val="F7B615"/>
+              </a:solidFill>
+              <a:latin typeface="Arial"/>
+              <a:ea typeface="DejaVu Sans"/>
+            </a:endParaRPr>
+          </a:p>
+          <a:p>
+            <a:pPr>
+              <a:lnSpc>
+                <a:spcPct val="90000"/>
+              </a:lnSpc>
+              <a:spcBef>
+                <a:spcPts val="1001"/>
+              </a:spcBef>
+              <a:buFont typeface="Wingdings" panose="05000000000000000000" pitchFamily="2" charset="2"/>
+              <a:buChar char="§"/>
+              <a:tabLst>
+                <a:tab pos="0" algn="l"/>
+              </a:tabLst>
+            </a:pPr>
+            <a:endParaRPr lang="de-DE" sz="2000" u="sng" spc="-1" dirty="0">
+              <a:solidFill>
+                <a:srgbClr val="F7B615"/>
+              </a:solidFill>
+              <a:latin typeface="Arial"/>
+              <a:ea typeface="DejaVu Sans"/>
             </a:endParaRPr>
           </a:p>
         </p:txBody>
@@ -17385,7 +17501,7 @@
         <p:fade/>
       </p:transition>
     </mc:Choice>
-    <mc:Fallback xmlns:p15="http://schemas.microsoft.com/office/powerpoint/2012/main" xmlns="">
+    <mc:Fallback xmlns="" xmlns:p15="http://schemas.microsoft.com/office/powerpoint/2012/main">
       <p:transition spd="med">
         <p:fade/>
       </p:transition>
@@ -17962,7 +18078,7 @@
         <p:fade/>
       </p:transition>
     </mc:Choice>
-    <mc:Fallback xmlns:p15="http://schemas.microsoft.com/office/powerpoint/2012/main" xmlns="">
+    <mc:Fallback xmlns="" xmlns:p15="http://schemas.microsoft.com/office/powerpoint/2012/main">
       <p:transition spd="med">
         <p:fade/>
       </p:transition>
@@ -18326,7 +18442,7 @@
         <p:fade/>
       </p:transition>
     </mc:Choice>
-    <mc:Fallback xmlns:p15="http://schemas.microsoft.com/office/powerpoint/2012/main" xmlns="">
+    <mc:Fallback xmlns="" xmlns:p15="http://schemas.microsoft.com/office/powerpoint/2012/main">
       <p:transition spd="med">
         <p:fade/>
       </p:transition>
@@ -18770,7 +18886,7 @@
         <p:fade/>
       </p:transition>
     </mc:Choice>
-    <mc:Fallback xmlns:p15="http://schemas.microsoft.com/office/powerpoint/2012/main" xmlns="">
+    <mc:Fallback xmlns="" xmlns:p15="http://schemas.microsoft.com/office/powerpoint/2012/main">
       <p:transition spd="med">
         <p:fade/>
       </p:transition>
@@ -19358,7 +19474,7 @@
         <p:fade/>
       </p:transition>
     </mc:Choice>
-    <mc:Fallback xmlns:p15="http://schemas.microsoft.com/office/powerpoint/2012/main" xmlns="">
+    <mc:Fallback xmlns="" xmlns:p15="http://schemas.microsoft.com/office/powerpoint/2012/main">
       <p:transition spd="med">
         <p:fade/>
       </p:transition>
@@ -19694,7 +19810,7 @@
         <p:fade/>
       </p:transition>
     </mc:Choice>
-    <mc:Fallback xmlns:p15="http://schemas.microsoft.com/office/powerpoint/2012/main" xmlns="">
+    <mc:Fallback xmlns="" xmlns:p15="http://schemas.microsoft.com/office/powerpoint/2012/main">
       <p:transition spd="med">
         <p:fade/>
       </p:transition>
@@ -19906,7 +20022,7 @@
         <p:fade/>
       </p:transition>
     </mc:Choice>
-    <mc:Fallback xmlns:p15="http://schemas.microsoft.com/office/powerpoint/2012/main" xmlns="">
+    <mc:Fallback xmlns="" xmlns:p15="http://schemas.microsoft.com/office/powerpoint/2012/main">
       <p:transition spd="med">
         <p:fade/>
       </p:transition>
@@ -20186,7 +20302,7 @@
         <p:fade/>
       </p:transition>
     </mc:Choice>
-    <mc:Fallback xmlns:p15="http://schemas.microsoft.com/office/powerpoint/2012/main" xmlns="">
+    <mc:Fallback xmlns="" xmlns:p15="http://schemas.microsoft.com/office/powerpoint/2012/main">
       <p:transition spd="med">
         <p:fade/>
       </p:transition>
@@ -20315,7 +20431,7 @@
         <p:fade/>
       </p:transition>
     </mc:Choice>
-    <mc:Fallback xmlns:p15="http://schemas.microsoft.com/office/powerpoint/2012/main" xmlns="">
+    <mc:Fallback xmlns="" xmlns:p15="http://schemas.microsoft.com/office/powerpoint/2012/main">
       <p:transition spd="med">
         <p:fade/>
       </p:transition>
@@ -20847,7 +20963,7 @@
         <p:fade/>
       </p:transition>
     </mc:Choice>
-    <mc:Fallback xmlns:p15="http://schemas.microsoft.com/office/powerpoint/2012/main" xmlns="">
+    <mc:Fallback xmlns="" xmlns:p15="http://schemas.microsoft.com/office/powerpoint/2012/main">
       <p:transition spd="med">
         <p:fade/>
       </p:transition>

</xml_diff>